<commit_message>
Updated App files for JSON format
</commit_message>
<xml_diff>
--- a/Microservices Architecture.pptx
+++ b/Microservices Architecture.pptx
@@ -5,7 +5,7 @@
     <p:sldMasterId id="2147483677" r:id="rId1"/>
   </p:sldMasterIdLst>
   <p:notesMasterIdLst>
-    <p:notesMasterId r:id="rId19"/>
+    <p:notesMasterId r:id="rId21"/>
   </p:notesMasterIdLst>
   <p:sldIdLst>
     <p:sldId id="260" r:id="rId2"/>
@@ -19,12 +19,14 @@
     <p:sldId id="307" r:id="rId10"/>
     <p:sldId id="308" r:id="rId11"/>
     <p:sldId id="309" r:id="rId12"/>
-    <p:sldId id="310" r:id="rId13"/>
-    <p:sldId id="311" r:id="rId14"/>
-    <p:sldId id="303" r:id="rId15"/>
-    <p:sldId id="312" r:id="rId16"/>
-    <p:sldId id="302" r:id="rId17"/>
-    <p:sldId id="304" r:id="rId18"/>
+    <p:sldId id="316" r:id="rId13"/>
+    <p:sldId id="310" r:id="rId14"/>
+    <p:sldId id="311" r:id="rId15"/>
+    <p:sldId id="317" r:id="rId16"/>
+    <p:sldId id="303" r:id="rId17"/>
+    <p:sldId id="312" r:id="rId18"/>
+    <p:sldId id="302" r:id="rId19"/>
+    <p:sldId id="304" r:id="rId20"/>
   </p:sldIdLst>
   <p:sldSz cx="14630400" cy="8229600"/>
   <p:notesSz cx="6858000" cy="9144000"/>
@@ -4583,7 +4585,7 @@
         <p:fade/>
       </p:transition>
     </mc:Choice>
-    <mc:Fallback xmlns:ahyp="http://schemas.microsoft.com/office/drawing/2018/hyperlinkcolor" xmlns:p15="http://schemas.microsoft.com/office/powerpoint/2012/main" xmlns:com="http://schemas.openxmlformats.org/drawingml/2006/compatibility" xmlns:pvml="urn:schemas-microsoft-com:office:powerpoint" xmlns:v="urn:schemas-microsoft-com:vml" xmlns:o="urn:schemas-microsoft-com:office:office" xmlns:dgm="http://schemas.openxmlformats.org/drawingml/2006/diagram" xmlns:c="http://schemas.openxmlformats.org/drawingml/2006/chart" xmlns:mv="urn:schemas-microsoft-com:mac:vml" xmlns="">
+    <mc:Fallback xmlns="" xmlns:mv="urn:schemas-microsoft-com:mac:vml" xmlns:c="http://schemas.openxmlformats.org/drawingml/2006/chart" xmlns:dgm="http://schemas.openxmlformats.org/drawingml/2006/diagram" xmlns:o="urn:schemas-microsoft-com:office:office" xmlns:v="urn:schemas-microsoft-com:vml" xmlns:pvml="urn:schemas-microsoft-com:office:powerpoint" xmlns:com="http://schemas.openxmlformats.org/drawingml/2006/compatibility" xmlns:p15="http://schemas.microsoft.com/office/powerpoint/2012/main" xmlns:ahyp="http://schemas.microsoft.com/office/drawing/2018/hyperlinkcolor">
       <p:transition spd="slow">
         <p:fade/>
       </p:transition>
@@ -4928,7 +4930,7 @@
         <p:fade/>
       </p:transition>
     </mc:Choice>
-    <mc:Fallback xmlns:ahyp="http://schemas.microsoft.com/office/drawing/2018/hyperlinkcolor" xmlns:p15="http://schemas.microsoft.com/office/powerpoint/2012/main" xmlns:com="http://schemas.openxmlformats.org/drawingml/2006/compatibility" xmlns:pvml="urn:schemas-microsoft-com:office:powerpoint" xmlns:v="urn:schemas-microsoft-com:vml" xmlns:o="urn:schemas-microsoft-com:office:office" xmlns:dgm="http://schemas.openxmlformats.org/drawingml/2006/diagram" xmlns:c="http://schemas.openxmlformats.org/drawingml/2006/chart" xmlns:mv="urn:schemas-microsoft-com:mac:vml" xmlns="">
+    <mc:Fallback xmlns="" xmlns:mv="urn:schemas-microsoft-com:mac:vml" xmlns:c="http://schemas.openxmlformats.org/drawingml/2006/chart" xmlns:dgm="http://schemas.openxmlformats.org/drawingml/2006/diagram" xmlns:o="urn:schemas-microsoft-com:office:office" xmlns:v="urn:schemas-microsoft-com:vml" xmlns:pvml="urn:schemas-microsoft-com:office:powerpoint" xmlns:com="http://schemas.openxmlformats.org/drawingml/2006/compatibility" xmlns:p15="http://schemas.microsoft.com/office/powerpoint/2012/main" xmlns:ahyp="http://schemas.microsoft.com/office/drawing/2018/hyperlinkcolor">
       <p:transition spd="slow">
         <p:fade/>
       </p:transition>
@@ -6292,7 +6294,7 @@
         <p:fade/>
       </p:transition>
     </mc:Choice>
-    <mc:Fallback xmlns:ahyp="http://schemas.microsoft.com/office/drawing/2018/hyperlinkcolor" xmlns:p15="http://schemas.microsoft.com/office/powerpoint/2012/main" xmlns:com="http://schemas.openxmlformats.org/drawingml/2006/compatibility" xmlns:pvml="urn:schemas-microsoft-com:office:powerpoint" xmlns:v="urn:schemas-microsoft-com:vml" xmlns:o="urn:schemas-microsoft-com:office:office" xmlns:dgm="http://schemas.openxmlformats.org/drawingml/2006/diagram" xmlns:c="http://schemas.openxmlformats.org/drawingml/2006/chart" xmlns:mv="urn:schemas-microsoft-com:mac:vml" xmlns="">
+    <mc:Fallback xmlns="" xmlns:mv="urn:schemas-microsoft-com:mac:vml" xmlns:c="http://schemas.openxmlformats.org/drawingml/2006/chart" xmlns:dgm="http://schemas.openxmlformats.org/drawingml/2006/diagram" xmlns:o="urn:schemas-microsoft-com:office:office" xmlns:v="urn:schemas-microsoft-com:vml" xmlns:pvml="urn:schemas-microsoft-com:office:powerpoint" xmlns:com="http://schemas.openxmlformats.org/drawingml/2006/compatibility" xmlns:p15="http://schemas.microsoft.com/office/powerpoint/2012/main" xmlns:ahyp="http://schemas.microsoft.com/office/drawing/2018/hyperlinkcolor">
       <p:transition spd="slow">
         <p:fade/>
       </p:transition>
@@ -6634,7 +6636,7 @@
         <p:fade/>
       </p:transition>
     </mc:Choice>
-    <mc:Fallback xmlns:ahyp="http://schemas.microsoft.com/office/drawing/2018/hyperlinkcolor" xmlns:p15="http://schemas.microsoft.com/office/powerpoint/2012/main" xmlns:com="http://schemas.openxmlformats.org/drawingml/2006/compatibility" xmlns:pvml="urn:schemas-microsoft-com:office:powerpoint" xmlns:v="urn:schemas-microsoft-com:vml" xmlns:o="urn:schemas-microsoft-com:office:office" xmlns:dgm="http://schemas.openxmlformats.org/drawingml/2006/diagram" xmlns:c="http://schemas.openxmlformats.org/drawingml/2006/chart" xmlns:mv="urn:schemas-microsoft-com:mac:vml" xmlns="">
+    <mc:Fallback xmlns="" xmlns:mv="urn:schemas-microsoft-com:mac:vml" xmlns:c="http://schemas.openxmlformats.org/drawingml/2006/chart" xmlns:dgm="http://schemas.openxmlformats.org/drawingml/2006/diagram" xmlns:o="urn:schemas-microsoft-com:office:office" xmlns:v="urn:schemas-microsoft-com:vml" xmlns:pvml="urn:schemas-microsoft-com:office:powerpoint" xmlns:com="http://schemas.openxmlformats.org/drawingml/2006/compatibility" xmlns:p15="http://schemas.microsoft.com/office/powerpoint/2012/main" xmlns:ahyp="http://schemas.microsoft.com/office/drawing/2018/hyperlinkcolor">
       <p:transition spd="slow">
         <p:fade/>
       </p:transition>
@@ -7296,7 +7298,7 @@
         <p:fade/>
       </p:transition>
     </mc:Choice>
-    <mc:Fallback xmlns:ahyp="http://schemas.microsoft.com/office/drawing/2018/hyperlinkcolor" xmlns:p15="http://schemas.microsoft.com/office/powerpoint/2012/main" xmlns:com="http://schemas.openxmlformats.org/drawingml/2006/compatibility" xmlns:pvml="urn:schemas-microsoft-com:office:powerpoint" xmlns:v="urn:schemas-microsoft-com:vml" xmlns:o="urn:schemas-microsoft-com:office:office" xmlns:dgm="http://schemas.openxmlformats.org/drawingml/2006/diagram" xmlns:c="http://schemas.openxmlformats.org/drawingml/2006/chart" xmlns:mv="urn:schemas-microsoft-com:mac:vml" xmlns="">
+    <mc:Fallback xmlns="" xmlns:mv="urn:schemas-microsoft-com:mac:vml" xmlns:c="http://schemas.openxmlformats.org/drawingml/2006/chart" xmlns:dgm="http://schemas.openxmlformats.org/drawingml/2006/diagram" xmlns:o="urn:schemas-microsoft-com:office:office" xmlns:v="urn:schemas-microsoft-com:vml" xmlns:pvml="urn:schemas-microsoft-com:office:powerpoint" xmlns:com="http://schemas.openxmlformats.org/drawingml/2006/compatibility" xmlns:p15="http://schemas.microsoft.com/office/powerpoint/2012/main" xmlns:ahyp="http://schemas.microsoft.com/office/drawing/2018/hyperlinkcolor">
       <p:transition spd="slow">
         <p:fade/>
       </p:transition>
@@ -8233,7 +8235,7 @@
         <p:fade/>
       </p:transition>
     </mc:Choice>
-    <mc:Fallback xmlns:ahyp="http://schemas.microsoft.com/office/drawing/2018/hyperlinkcolor" xmlns:p15="http://schemas.microsoft.com/office/powerpoint/2012/main" xmlns:com="http://schemas.openxmlformats.org/drawingml/2006/compatibility" xmlns:pvml="urn:schemas-microsoft-com:office:powerpoint" xmlns:v="urn:schemas-microsoft-com:vml" xmlns:o="urn:schemas-microsoft-com:office:office" xmlns:dgm="http://schemas.openxmlformats.org/drawingml/2006/diagram" xmlns:c="http://schemas.openxmlformats.org/drawingml/2006/chart" xmlns:mv="urn:schemas-microsoft-com:mac:vml" xmlns="">
+    <mc:Fallback xmlns="" xmlns:mv="urn:schemas-microsoft-com:mac:vml" xmlns:c="http://schemas.openxmlformats.org/drawingml/2006/chart" xmlns:dgm="http://schemas.openxmlformats.org/drawingml/2006/diagram" xmlns:o="urn:schemas-microsoft-com:office:office" xmlns:v="urn:schemas-microsoft-com:vml" xmlns:pvml="urn:schemas-microsoft-com:office:powerpoint" xmlns:com="http://schemas.openxmlformats.org/drawingml/2006/compatibility" xmlns:p15="http://schemas.microsoft.com/office/powerpoint/2012/main" xmlns:ahyp="http://schemas.microsoft.com/office/drawing/2018/hyperlinkcolor">
       <p:transition spd="slow">
         <p:fade/>
       </p:transition>
@@ -9570,7 +9572,7 @@
         <p:fade/>
       </p:transition>
     </mc:Choice>
-    <mc:Fallback xmlns:ahyp="http://schemas.microsoft.com/office/drawing/2018/hyperlinkcolor" xmlns:p15="http://schemas.microsoft.com/office/powerpoint/2012/main" xmlns:com="http://schemas.openxmlformats.org/drawingml/2006/compatibility" xmlns:pvml="urn:schemas-microsoft-com:office:powerpoint" xmlns:v="urn:schemas-microsoft-com:vml" xmlns:o="urn:schemas-microsoft-com:office:office" xmlns:dgm="http://schemas.openxmlformats.org/drawingml/2006/diagram" xmlns:c="http://schemas.openxmlformats.org/drawingml/2006/chart" xmlns:mv="urn:schemas-microsoft-com:mac:vml" xmlns="">
+    <mc:Fallback xmlns="" xmlns:mv="urn:schemas-microsoft-com:mac:vml" xmlns:c="http://schemas.openxmlformats.org/drawingml/2006/chart" xmlns:dgm="http://schemas.openxmlformats.org/drawingml/2006/diagram" xmlns:o="urn:schemas-microsoft-com:office:office" xmlns:v="urn:schemas-microsoft-com:vml" xmlns:pvml="urn:schemas-microsoft-com:office:powerpoint" xmlns:com="http://schemas.openxmlformats.org/drawingml/2006/compatibility" xmlns:p15="http://schemas.microsoft.com/office/powerpoint/2012/main" xmlns:ahyp="http://schemas.microsoft.com/office/drawing/2018/hyperlinkcolor">
       <p:transition spd="slow">
         <p:fade/>
       </p:transition>
@@ -10988,7 +10990,7 @@
         <p:fade/>
       </p:transition>
     </mc:Choice>
-    <mc:Fallback xmlns:ahyp="http://schemas.microsoft.com/office/drawing/2018/hyperlinkcolor" xmlns:p15="http://schemas.microsoft.com/office/powerpoint/2012/main" xmlns:com="http://schemas.openxmlformats.org/drawingml/2006/compatibility" xmlns:pvml="urn:schemas-microsoft-com:office:powerpoint" xmlns:v="urn:schemas-microsoft-com:vml" xmlns:o="urn:schemas-microsoft-com:office:office" xmlns:dgm="http://schemas.openxmlformats.org/drawingml/2006/diagram" xmlns:c="http://schemas.openxmlformats.org/drawingml/2006/chart" xmlns:mv="urn:schemas-microsoft-com:mac:vml" xmlns="">
+    <mc:Fallback xmlns="" xmlns:mv="urn:schemas-microsoft-com:mac:vml" xmlns:c="http://schemas.openxmlformats.org/drawingml/2006/chart" xmlns:dgm="http://schemas.openxmlformats.org/drawingml/2006/diagram" xmlns:o="urn:schemas-microsoft-com:office:office" xmlns:v="urn:schemas-microsoft-com:vml" xmlns:pvml="urn:schemas-microsoft-com:office:powerpoint" xmlns:com="http://schemas.openxmlformats.org/drawingml/2006/compatibility" xmlns:p15="http://schemas.microsoft.com/office/powerpoint/2012/main" xmlns:ahyp="http://schemas.microsoft.com/office/drawing/2018/hyperlinkcolor">
       <p:transition spd="slow">
         <p:fade/>
       </p:transition>
@@ -11877,7 +11879,7 @@
         <p:fade/>
       </p:transition>
     </mc:Choice>
-    <mc:Fallback xmlns:ahyp="http://schemas.microsoft.com/office/drawing/2018/hyperlinkcolor" xmlns:p15="http://schemas.microsoft.com/office/powerpoint/2012/main" xmlns:com="http://schemas.openxmlformats.org/drawingml/2006/compatibility" xmlns:pvml="urn:schemas-microsoft-com:office:powerpoint" xmlns:v="urn:schemas-microsoft-com:vml" xmlns:o="urn:schemas-microsoft-com:office:office" xmlns:dgm="http://schemas.openxmlformats.org/drawingml/2006/diagram" xmlns:c="http://schemas.openxmlformats.org/drawingml/2006/chart" xmlns:mv="urn:schemas-microsoft-com:mac:vml" xmlns="">
+    <mc:Fallback xmlns="" xmlns:mv="urn:schemas-microsoft-com:mac:vml" xmlns:c="http://schemas.openxmlformats.org/drawingml/2006/chart" xmlns:dgm="http://schemas.openxmlformats.org/drawingml/2006/diagram" xmlns:o="urn:schemas-microsoft-com:office:office" xmlns:v="urn:schemas-microsoft-com:vml" xmlns:pvml="urn:schemas-microsoft-com:office:powerpoint" xmlns:com="http://schemas.openxmlformats.org/drawingml/2006/compatibility" xmlns:p15="http://schemas.microsoft.com/office/powerpoint/2012/main" xmlns:ahyp="http://schemas.microsoft.com/office/drawing/2018/hyperlinkcolor">
       <p:transition spd="slow">
         <p:fade/>
       </p:transition>
@@ -12031,7 +12033,7 @@
         <p:fade/>
       </p:transition>
     </mc:Choice>
-    <mc:Fallback xmlns:ahyp="http://schemas.microsoft.com/office/drawing/2018/hyperlinkcolor" xmlns:p15="http://schemas.microsoft.com/office/powerpoint/2012/main" xmlns:com="http://schemas.openxmlformats.org/drawingml/2006/compatibility" xmlns:pvml="urn:schemas-microsoft-com:office:powerpoint" xmlns:v="urn:schemas-microsoft-com:vml" xmlns:o="urn:schemas-microsoft-com:office:office" xmlns:dgm="http://schemas.openxmlformats.org/drawingml/2006/diagram" xmlns:c="http://schemas.openxmlformats.org/drawingml/2006/chart" xmlns:mv="urn:schemas-microsoft-com:mac:vml" xmlns="">
+    <mc:Fallback xmlns="" xmlns:mv="urn:schemas-microsoft-com:mac:vml" xmlns:c="http://schemas.openxmlformats.org/drawingml/2006/chart" xmlns:dgm="http://schemas.openxmlformats.org/drawingml/2006/diagram" xmlns:o="urn:schemas-microsoft-com:office:office" xmlns:v="urn:schemas-microsoft-com:vml" xmlns:pvml="urn:schemas-microsoft-com:office:powerpoint" xmlns:com="http://schemas.openxmlformats.org/drawingml/2006/compatibility" xmlns:p15="http://schemas.microsoft.com/office/powerpoint/2012/main" xmlns:ahyp="http://schemas.microsoft.com/office/drawing/2018/hyperlinkcolor">
       <p:transition spd="slow">
         <p:fade/>
       </p:transition>
@@ -13165,7 +13167,7 @@
         <p:fade/>
       </p:transition>
     </mc:Choice>
-    <mc:Fallback xmlns:ahyp="http://schemas.microsoft.com/office/drawing/2018/hyperlinkcolor" xmlns:p15="http://schemas.microsoft.com/office/powerpoint/2012/main" xmlns:com="http://schemas.openxmlformats.org/drawingml/2006/compatibility" xmlns:pvml="urn:schemas-microsoft-com:office:powerpoint" xmlns:v="urn:schemas-microsoft-com:vml" xmlns:o="urn:schemas-microsoft-com:office:office" xmlns:dgm="http://schemas.openxmlformats.org/drawingml/2006/diagram" xmlns:c="http://schemas.openxmlformats.org/drawingml/2006/chart" xmlns:mv="urn:schemas-microsoft-com:mac:vml" xmlns="">
+    <mc:Fallback xmlns="" xmlns:mv="urn:schemas-microsoft-com:mac:vml" xmlns:c="http://schemas.openxmlformats.org/drawingml/2006/chart" xmlns:dgm="http://schemas.openxmlformats.org/drawingml/2006/diagram" xmlns:o="urn:schemas-microsoft-com:office:office" xmlns:v="urn:schemas-microsoft-com:vml" xmlns:pvml="urn:schemas-microsoft-com:office:powerpoint" xmlns:com="http://schemas.openxmlformats.org/drawingml/2006/compatibility" xmlns:p15="http://schemas.microsoft.com/office/powerpoint/2012/main" xmlns:ahyp="http://schemas.microsoft.com/office/drawing/2018/hyperlinkcolor">
       <p:transition spd="slow">
         <p:fade/>
       </p:transition>
@@ -13331,6 +13333,109 @@
   <p:cSld>
     <p:spTree>
       <p:nvGrpSpPr>
+        <p:cNvPr id="1" name=""/>
+        <p:cNvGrpSpPr/>
+        <p:nvPr/>
+      </p:nvGrpSpPr>
+      <p:grpSpPr>
+        <a:xfrm>
+          <a:off x="0" y="0"/>
+          <a:ext cx="0" cy="0"/>
+          <a:chOff x="0" y="0"/>
+          <a:chExt cx="0" cy="0"/>
+        </a:xfrm>
+      </p:grpSpPr>
+      <p:sp>
+        <p:nvSpPr>
+          <p:cNvPr id="5" name="Title 4"/>
+          <p:cNvSpPr>
+            <a:spLocks noGrp="1"/>
+          </p:cNvSpPr>
+          <p:nvPr>
+            <p:ph type="title"/>
+          </p:nvPr>
+        </p:nvSpPr>
+        <p:spPr/>
+        <p:txBody>
+          <a:bodyPr/>
+          <a:lstStyle/>
+          <a:p>
+            <a:r>
+              <a:rPr lang="en-GB" dirty="0" smtClean="0"/>
+              <a:t>Microservice 3 Lambda Code</a:t>
+            </a:r>
+            <a:endParaRPr lang="en-GB" dirty="0"/>
+          </a:p>
+        </p:txBody>
+      </p:sp>
+      <p:pic>
+        <p:nvPicPr>
+          <p:cNvPr id="2" name="Picture 1"/>
+          <p:cNvPicPr>
+            <a:picLocks noChangeAspect="1"/>
+          </p:cNvPicPr>
+          <p:nvPr/>
+        </p:nvPicPr>
+        <p:blipFill>
+          <a:blip r:embed="rId2"/>
+          <a:stretch>
+            <a:fillRect/>
+          </a:stretch>
+        </p:blipFill>
+        <p:spPr>
+          <a:xfrm>
+            <a:off x="1004878" y="1348581"/>
+            <a:ext cx="9578178" cy="5901437"/>
+          </a:xfrm>
+          <a:prstGeom prst="rect">
+            <a:avLst/>
+          </a:prstGeom>
+          <a:ln w="38100" cap="sq">
+            <a:solidFill>
+              <a:srgbClr val="000000"/>
+            </a:solidFill>
+            <a:prstDash val="solid"/>
+            <a:miter lim="800000"/>
+          </a:ln>
+          <a:effectLst>
+            <a:outerShdw blurRad="50800" dist="38100" dir="2700000" algn="tl" rotWithShape="0">
+              <a:srgbClr val="000000">
+                <a:alpha val="43000"/>
+              </a:srgbClr>
+            </a:outerShdw>
+          </a:effectLst>
+        </p:spPr>
+      </p:pic>
+    </p:spTree>
+    <p:extLst>
+      <p:ext uri="{BB962C8B-B14F-4D97-AF65-F5344CB8AC3E}">
+        <p14:creationId xmlns:p14="http://schemas.microsoft.com/office/powerpoint/2010/main" val="639340243"/>
+      </p:ext>
+    </p:extLst>
+  </p:cSld>
+  <p:clrMapOvr>
+    <a:masterClrMapping/>
+  </p:clrMapOvr>
+  <mc:AlternateContent xmlns:mc="http://schemas.openxmlformats.org/markup-compatibility/2006" xmlns:p14="http://schemas.microsoft.com/office/powerpoint/2010/main">
+    <mc:Choice Requires="p14">
+      <p:transition spd="med" p14:dur="700">
+        <p:fade/>
+      </p:transition>
+    </mc:Choice>
+    <mc:Fallback xmlns="" xmlns:mv="urn:schemas-microsoft-com:mac:vml" xmlns:c="http://schemas.openxmlformats.org/drawingml/2006/chart" xmlns:dgm="http://schemas.openxmlformats.org/drawingml/2006/diagram" xmlns:o="urn:schemas-microsoft-com:office:office" xmlns:v="urn:schemas-microsoft-com:vml" xmlns:pvml="urn:schemas-microsoft-com:office:powerpoint" xmlns:com="http://schemas.openxmlformats.org/drawingml/2006/compatibility" xmlns:p15="http://schemas.microsoft.com/office/powerpoint/2012/main" xmlns:ahyp="http://schemas.microsoft.com/office/drawing/2018/hyperlinkcolor">
+      <p:transition spd="slow">
+        <p:fade/>
+      </p:transition>
+    </mc:Fallback>
+  </mc:AlternateContent>
+</p:sld>
+</file>
+
+<file path=ppt/slides/slide13.xml><?xml version="1.0" encoding="utf-8"?>
+<p:sld xmlns:a="http://schemas.openxmlformats.org/drawingml/2006/main" xmlns:r="http://schemas.openxmlformats.org/officeDocument/2006/relationships" xmlns:p="http://schemas.openxmlformats.org/presentationml/2006/main">
+  <p:cSld>
+    <p:spTree>
+      <p:nvGrpSpPr>
         <p:cNvPr id="1" name="Shape 971"/>
         <p:cNvGrpSpPr/>
         <p:nvPr/>
@@ -13442,7 +13547,11 @@
             </a:pPr>
             <a:r>
               <a:rPr lang="en-US" dirty="0" smtClean="0"/>
-              <a:t>Image Resize Service</a:t>
+              <a:t>User </a:t>
+            </a:r>
+            <a:r>
+              <a:rPr lang="en-US" smtClean="0"/>
+              <a:t>Clearance Level</a:t>
             </a:r>
             <a:endParaRPr dirty="0"/>
           </a:p>
@@ -13464,7 +13573,7 @@
         <p:fade/>
       </p:transition>
     </mc:Choice>
-    <mc:Fallback xmlns:ahyp="http://schemas.microsoft.com/office/drawing/2018/hyperlinkcolor" xmlns:p15="http://schemas.microsoft.com/office/powerpoint/2012/main" xmlns:com="http://schemas.openxmlformats.org/drawingml/2006/compatibility" xmlns:pvml="urn:schemas-microsoft-com:office:powerpoint" xmlns:v="urn:schemas-microsoft-com:vml" xmlns:o="urn:schemas-microsoft-com:office:office" xmlns:dgm="http://schemas.openxmlformats.org/drawingml/2006/diagram" xmlns:c="http://schemas.openxmlformats.org/drawingml/2006/chart" xmlns:mv="urn:schemas-microsoft-com:mac:vml" xmlns="">
+    <mc:Fallback xmlns="" xmlns:mv="urn:schemas-microsoft-com:mac:vml" xmlns:c="http://schemas.openxmlformats.org/drawingml/2006/chart" xmlns:dgm="http://schemas.openxmlformats.org/drawingml/2006/diagram" xmlns:o="urn:schemas-microsoft-com:office:office" xmlns:v="urn:schemas-microsoft-com:vml" xmlns:pvml="urn:schemas-microsoft-com:office:powerpoint" xmlns:com="http://schemas.openxmlformats.org/drawingml/2006/compatibility" xmlns:p15="http://schemas.microsoft.com/office/powerpoint/2012/main" xmlns:ahyp="http://schemas.microsoft.com/office/drawing/2018/hyperlinkcolor">
       <p:transition spd="slow">
         <p:fade/>
       </p:transition>
@@ -13480,7 +13589,7 @@
 </p:sld>
 </file>
 
-<file path=ppt/slides/slide13.xml><?xml version="1.0" encoding="utf-8"?>
+<file path=ppt/slides/slide14.xml><?xml version="1.0" encoding="utf-8"?>
 <p:sld xmlns:a="http://schemas.openxmlformats.org/drawingml/2006/main" xmlns:r="http://schemas.openxmlformats.org/officeDocument/2006/relationships" xmlns:p="http://schemas.openxmlformats.org/presentationml/2006/main">
   <p:cSld>
     <p:spTree>
@@ -14541,7 +14650,7 @@
         <p:fade/>
       </p:transition>
     </mc:Choice>
-    <mc:Fallback xmlns:ahyp="http://schemas.microsoft.com/office/drawing/2018/hyperlinkcolor" xmlns:p15="http://schemas.microsoft.com/office/powerpoint/2012/main" xmlns:com="http://schemas.openxmlformats.org/drawingml/2006/compatibility" xmlns:pvml="urn:schemas-microsoft-com:office:powerpoint" xmlns:v="urn:schemas-microsoft-com:vml" xmlns:o="urn:schemas-microsoft-com:office:office" xmlns:dgm="http://schemas.openxmlformats.org/drawingml/2006/diagram" xmlns:c="http://schemas.openxmlformats.org/drawingml/2006/chart" xmlns:mv="urn:schemas-microsoft-com:mac:vml" xmlns="">
+    <mc:Fallback xmlns="" xmlns:mv="urn:schemas-microsoft-com:mac:vml" xmlns:c="http://schemas.openxmlformats.org/drawingml/2006/chart" xmlns:dgm="http://schemas.openxmlformats.org/drawingml/2006/diagram" xmlns:o="urn:schemas-microsoft-com:office:office" xmlns:v="urn:schemas-microsoft-com:vml" xmlns:pvml="urn:schemas-microsoft-com:office:powerpoint" xmlns:com="http://schemas.openxmlformats.org/drawingml/2006/compatibility" xmlns:p15="http://schemas.microsoft.com/office/powerpoint/2012/main" xmlns:ahyp="http://schemas.microsoft.com/office/drawing/2018/hyperlinkcolor">
       <p:transition spd="slow">
         <p:fade/>
       </p:transition>
@@ -14674,7 +14783,110 @@
 </p:sld>
 </file>
 
-<file path=ppt/slides/slide14.xml><?xml version="1.0" encoding="utf-8"?>
+<file path=ppt/slides/slide15.xml><?xml version="1.0" encoding="utf-8"?>
+<p:sld xmlns:a="http://schemas.openxmlformats.org/drawingml/2006/main" xmlns:r="http://schemas.openxmlformats.org/officeDocument/2006/relationships" xmlns:p="http://schemas.openxmlformats.org/presentationml/2006/main">
+  <p:cSld>
+    <p:spTree>
+      <p:nvGrpSpPr>
+        <p:cNvPr id="1" name=""/>
+        <p:cNvGrpSpPr/>
+        <p:nvPr/>
+      </p:nvGrpSpPr>
+      <p:grpSpPr>
+        <a:xfrm>
+          <a:off x="0" y="0"/>
+          <a:ext cx="0" cy="0"/>
+          <a:chOff x="0" y="0"/>
+          <a:chExt cx="0" cy="0"/>
+        </a:xfrm>
+      </p:grpSpPr>
+      <p:sp>
+        <p:nvSpPr>
+          <p:cNvPr id="5" name="Title 4"/>
+          <p:cNvSpPr>
+            <a:spLocks noGrp="1"/>
+          </p:cNvSpPr>
+          <p:nvPr>
+            <p:ph type="title"/>
+          </p:nvPr>
+        </p:nvSpPr>
+        <p:spPr/>
+        <p:txBody>
+          <a:bodyPr/>
+          <a:lstStyle/>
+          <a:p>
+            <a:r>
+              <a:rPr lang="en-GB" dirty="0" smtClean="0"/>
+              <a:t>Microservice 4 Lambda Code</a:t>
+            </a:r>
+            <a:endParaRPr lang="en-GB" dirty="0"/>
+          </a:p>
+        </p:txBody>
+      </p:sp>
+      <p:pic>
+        <p:nvPicPr>
+          <p:cNvPr id="4" name="Picture 3"/>
+          <p:cNvPicPr>
+            <a:picLocks noChangeAspect="1"/>
+          </p:cNvPicPr>
+          <p:nvPr/>
+        </p:nvPicPr>
+        <p:blipFill>
+          <a:blip r:embed="rId2"/>
+          <a:stretch>
+            <a:fillRect/>
+          </a:stretch>
+        </p:blipFill>
+        <p:spPr>
+          <a:xfrm>
+            <a:off x="1019892" y="1258640"/>
+            <a:ext cx="8971051" cy="6208812"/>
+          </a:xfrm>
+          <a:prstGeom prst="rect">
+            <a:avLst/>
+          </a:prstGeom>
+          <a:ln w="38100" cap="sq">
+            <a:solidFill>
+              <a:srgbClr val="000000"/>
+            </a:solidFill>
+            <a:prstDash val="solid"/>
+            <a:miter lim="800000"/>
+          </a:ln>
+          <a:effectLst>
+            <a:outerShdw blurRad="50800" dist="38100" dir="2700000" algn="tl" rotWithShape="0">
+              <a:srgbClr val="000000">
+                <a:alpha val="43000"/>
+              </a:srgbClr>
+            </a:outerShdw>
+          </a:effectLst>
+        </p:spPr>
+      </p:pic>
+    </p:spTree>
+    <p:extLst>
+      <p:ext uri="{BB962C8B-B14F-4D97-AF65-F5344CB8AC3E}">
+        <p14:creationId xmlns:p14="http://schemas.microsoft.com/office/powerpoint/2010/main" val="2556740960"/>
+      </p:ext>
+    </p:extLst>
+  </p:cSld>
+  <p:clrMapOvr>
+    <a:masterClrMapping/>
+  </p:clrMapOvr>
+  <mc:AlternateContent xmlns:mc="http://schemas.openxmlformats.org/markup-compatibility/2006" xmlns:p14="http://schemas.microsoft.com/office/powerpoint/2010/main">
+    <mc:Choice Requires="p14">
+      <p:transition spd="med" p14:dur="700">
+        <p:fade/>
+      </p:transition>
+    </mc:Choice>
+    <mc:Fallback xmlns="" xmlns:mv="urn:schemas-microsoft-com:mac:vml" xmlns:c="http://schemas.openxmlformats.org/drawingml/2006/chart" xmlns:dgm="http://schemas.openxmlformats.org/drawingml/2006/diagram" xmlns:o="urn:schemas-microsoft-com:office:office" xmlns:v="urn:schemas-microsoft-com:vml" xmlns:pvml="urn:schemas-microsoft-com:office:powerpoint" xmlns:com="http://schemas.openxmlformats.org/drawingml/2006/compatibility" xmlns:p15="http://schemas.microsoft.com/office/powerpoint/2012/main" xmlns:ahyp="http://schemas.microsoft.com/office/drawing/2018/hyperlinkcolor">
+      <p:transition spd="slow">
+        <p:fade/>
+      </p:transition>
+    </mc:Fallback>
+  </mc:AlternateContent>
+</p:sld>
+</file>
+
+<file path=ppt/slides/slide16.xml><?xml version="1.0" encoding="utf-8"?>
 <p:sld xmlns:a="http://schemas.openxmlformats.org/drawingml/2006/main" xmlns:r="http://schemas.openxmlformats.org/officeDocument/2006/relationships" xmlns:p="http://schemas.openxmlformats.org/presentationml/2006/main">
   <p:cSld>
     <p:spTree>
@@ -14756,7 +14968,7 @@
         <p:fade/>
       </p:transition>
     </mc:Choice>
-    <mc:Fallback xmlns:ahyp="http://schemas.microsoft.com/office/drawing/2018/hyperlinkcolor" xmlns:p15="http://schemas.microsoft.com/office/powerpoint/2012/main" xmlns:com="http://schemas.openxmlformats.org/drawingml/2006/compatibility" xmlns:pvml="urn:schemas-microsoft-com:office:powerpoint" xmlns:v="urn:schemas-microsoft-com:vml" xmlns:o="urn:schemas-microsoft-com:office:office" xmlns:dgm="http://schemas.openxmlformats.org/drawingml/2006/diagram" xmlns:c="http://schemas.openxmlformats.org/drawingml/2006/chart" xmlns:mv="urn:schemas-microsoft-com:mac:vml" xmlns="">
+    <mc:Fallback xmlns="" xmlns:mv="urn:schemas-microsoft-com:mac:vml" xmlns:c="http://schemas.openxmlformats.org/drawingml/2006/chart" xmlns:dgm="http://schemas.openxmlformats.org/drawingml/2006/diagram" xmlns:o="urn:schemas-microsoft-com:office:office" xmlns:v="urn:schemas-microsoft-com:vml" xmlns:pvml="urn:schemas-microsoft-com:office:powerpoint" xmlns:com="http://schemas.openxmlformats.org/drawingml/2006/compatibility" xmlns:p15="http://schemas.microsoft.com/office/powerpoint/2012/main" xmlns:ahyp="http://schemas.microsoft.com/office/drawing/2018/hyperlinkcolor">
       <p:transition spd="slow">
         <p:fade/>
       </p:transition>
@@ -14772,7 +14984,7 @@
 </p:sld>
 </file>
 
-<file path=ppt/slides/slide15.xml><?xml version="1.0" encoding="utf-8"?>
+<file path=ppt/slides/slide17.xml><?xml version="1.0" encoding="utf-8"?>
 <p:sld xmlns:a="http://schemas.openxmlformats.org/drawingml/2006/main" xmlns:r="http://schemas.openxmlformats.org/officeDocument/2006/relationships" xmlns:p="http://schemas.openxmlformats.org/presentationml/2006/main">
   <p:cSld>
     <p:spTree>
@@ -14905,7 +15117,7 @@
         <p:fade/>
       </p:transition>
     </mc:Choice>
-    <mc:Fallback xmlns:ahyp="http://schemas.microsoft.com/office/drawing/2018/hyperlinkcolor" xmlns:p15="http://schemas.microsoft.com/office/powerpoint/2012/main" xmlns:com="http://schemas.openxmlformats.org/drawingml/2006/compatibility" xmlns:pvml="urn:schemas-microsoft-com:office:powerpoint" xmlns:v="urn:schemas-microsoft-com:vml" xmlns:o="urn:schemas-microsoft-com:office:office" xmlns:dgm="http://schemas.openxmlformats.org/drawingml/2006/diagram" xmlns:c="http://schemas.openxmlformats.org/drawingml/2006/chart" xmlns:mv="urn:schemas-microsoft-com:mac:vml" xmlns="">
+    <mc:Fallback xmlns="" xmlns:mv="urn:schemas-microsoft-com:mac:vml" xmlns:c="http://schemas.openxmlformats.org/drawingml/2006/chart" xmlns:dgm="http://schemas.openxmlformats.org/drawingml/2006/diagram" xmlns:o="urn:schemas-microsoft-com:office:office" xmlns:v="urn:schemas-microsoft-com:vml" xmlns:pvml="urn:schemas-microsoft-com:office:powerpoint" xmlns:com="http://schemas.openxmlformats.org/drawingml/2006/compatibility" xmlns:p15="http://schemas.microsoft.com/office/powerpoint/2012/main" xmlns:ahyp="http://schemas.microsoft.com/office/drawing/2018/hyperlinkcolor">
       <p:transition spd="slow">
         <p:fade/>
       </p:transition>
@@ -14914,7 +15126,7 @@
 </p:sld>
 </file>
 
-<file path=ppt/slides/slide16.xml><?xml version="1.0" encoding="utf-8"?>
+<file path=ppt/slides/slide18.xml><?xml version="1.0" encoding="utf-8"?>
 <p:sld xmlns:a="http://schemas.openxmlformats.org/drawingml/2006/main" xmlns:r="http://schemas.openxmlformats.org/officeDocument/2006/relationships" xmlns:p="http://schemas.openxmlformats.org/presentationml/2006/main">
   <p:cSld>
     <p:spTree>
@@ -17696,7 +17908,7 @@
         <p:fade/>
       </p:transition>
     </mc:Choice>
-    <mc:Fallback xmlns:ahyp="http://schemas.microsoft.com/office/drawing/2018/hyperlinkcolor" xmlns:p15="http://schemas.microsoft.com/office/powerpoint/2012/main" xmlns:com="http://schemas.openxmlformats.org/drawingml/2006/compatibility" xmlns:pvml="urn:schemas-microsoft-com:office:powerpoint" xmlns:v="urn:schemas-microsoft-com:vml" xmlns:o="urn:schemas-microsoft-com:office:office" xmlns:dgm="http://schemas.openxmlformats.org/drawingml/2006/diagram" xmlns:c="http://schemas.openxmlformats.org/drawingml/2006/chart" xmlns:mv="urn:schemas-microsoft-com:mac:vml" xmlns="">
+    <mc:Fallback xmlns="" xmlns:mv="urn:schemas-microsoft-com:mac:vml" xmlns:c="http://schemas.openxmlformats.org/drawingml/2006/chart" xmlns:dgm="http://schemas.openxmlformats.org/drawingml/2006/diagram" xmlns:o="urn:schemas-microsoft-com:office:office" xmlns:v="urn:schemas-microsoft-com:vml" xmlns:pvml="urn:schemas-microsoft-com:office:powerpoint" xmlns:com="http://schemas.openxmlformats.org/drawingml/2006/compatibility" xmlns:p15="http://schemas.microsoft.com/office/powerpoint/2012/main" xmlns:ahyp="http://schemas.microsoft.com/office/drawing/2018/hyperlinkcolor">
       <p:transition spd="slow">
         <p:fade/>
       </p:transition>
@@ -17712,7 +17924,7 @@
 </p:sld>
 </file>
 
-<file path=ppt/slides/slide17.xml><?xml version="1.0" encoding="utf-8"?>
+<file path=ppt/slides/slide19.xml><?xml version="1.0" encoding="utf-8"?>
 <p:sld xmlns:a="http://schemas.openxmlformats.org/drawingml/2006/main" xmlns:r="http://schemas.openxmlformats.org/officeDocument/2006/relationships" xmlns:p="http://schemas.openxmlformats.org/presentationml/2006/main">
   <p:cSld>
     <p:spTree>
@@ -17740,7 +17952,7 @@
         <p:fade/>
       </p:transition>
     </mc:Choice>
-    <mc:Fallback xmlns:ahyp="http://schemas.microsoft.com/office/drawing/2018/hyperlinkcolor" xmlns:p15="http://schemas.microsoft.com/office/powerpoint/2012/main" xmlns:com="http://schemas.openxmlformats.org/drawingml/2006/compatibility" xmlns:pvml="urn:schemas-microsoft-com:office:powerpoint" xmlns:v="urn:schemas-microsoft-com:vml" xmlns:o="urn:schemas-microsoft-com:office:office" xmlns:dgm="http://schemas.openxmlformats.org/drawingml/2006/diagram" xmlns:c="http://schemas.openxmlformats.org/drawingml/2006/chart" xmlns:mv="urn:schemas-microsoft-com:mac:vml" xmlns="">
+    <mc:Fallback xmlns="" xmlns:mv="urn:schemas-microsoft-com:mac:vml" xmlns:c="http://schemas.openxmlformats.org/drawingml/2006/chart" xmlns:dgm="http://schemas.openxmlformats.org/drawingml/2006/diagram" xmlns:o="urn:schemas-microsoft-com:office:office" xmlns:v="urn:schemas-microsoft-com:vml" xmlns:pvml="urn:schemas-microsoft-com:office:powerpoint" xmlns:com="http://schemas.openxmlformats.org/drawingml/2006/compatibility" xmlns:p15="http://schemas.microsoft.com/office/powerpoint/2012/main" xmlns:ahyp="http://schemas.microsoft.com/office/drawing/2018/hyperlinkcolor">
       <p:transition spd="slow">
         <p:fade/>
       </p:transition>
@@ -19092,7 +19304,7 @@
         <p:fade/>
       </p:transition>
     </mc:Choice>
-    <mc:Fallback xmlns:ahyp="http://schemas.microsoft.com/office/drawing/2018/hyperlinkcolor" xmlns:p15="http://schemas.microsoft.com/office/powerpoint/2012/main" xmlns:com="http://schemas.openxmlformats.org/drawingml/2006/compatibility" xmlns:pvml="urn:schemas-microsoft-com:office:powerpoint" xmlns:v="urn:schemas-microsoft-com:vml" xmlns:o="urn:schemas-microsoft-com:office:office" xmlns:dgm="http://schemas.openxmlformats.org/drawingml/2006/diagram" xmlns:c="http://schemas.openxmlformats.org/drawingml/2006/chart" xmlns:mv="urn:schemas-microsoft-com:mac:vml" xmlns="">
+    <mc:Fallback xmlns="" xmlns:mv="urn:schemas-microsoft-com:mac:vml" xmlns:c="http://schemas.openxmlformats.org/drawingml/2006/chart" xmlns:dgm="http://schemas.openxmlformats.org/drawingml/2006/diagram" xmlns:o="urn:schemas-microsoft-com:office:office" xmlns:v="urn:schemas-microsoft-com:vml" xmlns:pvml="urn:schemas-microsoft-com:office:powerpoint" xmlns:com="http://schemas.openxmlformats.org/drawingml/2006/compatibility" xmlns:p15="http://schemas.microsoft.com/office/powerpoint/2012/main" xmlns:ahyp="http://schemas.microsoft.com/office/drawing/2018/hyperlinkcolor">
       <p:transition spd="slow">
         <p:fade/>
       </p:transition>
@@ -19246,7 +19458,7 @@
         <p:fade/>
       </p:transition>
     </mc:Choice>
-    <mc:Fallback xmlns:ahyp="http://schemas.microsoft.com/office/drawing/2018/hyperlinkcolor" xmlns:p15="http://schemas.microsoft.com/office/powerpoint/2012/main" xmlns:com="http://schemas.openxmlformats.org/drawingml/2006/compatibility" xmlns:pvml="urn:schemas-microsoft-com:office:powerpoint" xmlns:v="urn:schemas-microsoft-com:vml" xmlns:o="urn:schemas-microsoft-com:office:office" xmlns:dgm="http://schemas.openxmlformats.org/drawingml/2006/diagram" xmlns:c="http://schemas.openxmlformats.org/drawingml/2006/chart" xmlns:mv="urn:schemas-microsoft-com:mac:vml" xmlns="">
+    <mc:Fallback xmlns="" xmlns:mv="urn:schemas-microsoft-com:mac:vml" xmlns:c="http://schemas.openxmlformats.org/drawingml/2006/chart" xmlns:dgm="http://schemas.openxmlformats.org/drawingml/2006/diagram" xmlns:o="urn:schemas-microsoft-com:office:office" xmlns:v="urn:schemas-microsoft-com:vml" xmlns:pvml="urn:schemas-microsoft-com:office:powerpoint" xmlns:com="http://schemas.openxmlformats.org/drawingml/2006/compatibility" xmlns:p15="http://schemas.microsoft.com/office/powerpoint/2012/main" xmlns:ahyp="http://schemas.microsoft.com/office/drawing/2018/hyperlinkcolor">
       <p:transition spd="slow">
         <p:fade/>
       </p:transition>
@@ -20307,7 +20519,7 @@
         <p:fade/>
       </p:transition>
     </mc:Choice>
-    <mc:Fallback xmlns:ahyp="http://schemas.microsoft.com/office/drawing/2018/hyperlinkcolor" xmlns:p15="http://schemas.microsoft.com/office/powerpoint/2012/main" xmlns:com="http://schemas.openxmlformats.org/drawingml/2006/compatibility" xmlns:pvml="urn:schemas-microsoft-com:office:powerpoint" xmlns:v="urn:schemas-microsoft-com:vml" xmlns:o="urn:schemas-microsoft-com:office:office" xmlns:dgm="http://schemas.openxmlformats.org/drawingml/2006/diagram" xmlns:c="http://schemas.openxmlformats.org/drawingml/2006/chart" xmlns:mv="urn:schemas-microsoft-com:mac:vml" xmlns="">
+    <mc:Fallback xmlns="" xmlns:mv="urn:schemas-microsoft-com:mac:vml" xmlns:c="http://schemas.openxmlformats.org/drawingml/2006/chart" xmlns:dgm="http://schemas.openxmlformats.org/drawingml/2006/diagram" xmlns:o="urn:schemas-microsoft-com:office:office" xmlns:v="urn:schemas-microsoft-com:vml" xmlns:pvml="urn:schemas-microsoft-com:office:powerpoint" xmlns:com="http://schemas.openxmlformats.org/drawingml/2006/compatibility" xmlns:p15="http://schemas.microsoft.com/office/powerpoint/2012/main" xmlns:ahyp="http://schemas.microsoft.com/office/drawing/2018/hyperlinkcolor">
       <p:transition spd="slow">
         <p:fade/>
       </p:transition>
@@ -20402,7 +20614,7 @@
             </a:pPr>
             <a:r>
               <a:rPr lang="en-GB" sz="1400" b="0" dirty="0" smtClean="0"/>
-              <a:t>In terms of scale, large scale deployment of the architecture may not be suitable for Heroku and an alternative such as pure Lambda functions or EC2 reserved instances should be considered.  However, for the requirements of this system.  Heroku was suitable and met all requirements.</a:t>
+              <a:t>In terms of scale, large scale deployment of the architecture may not be suitable for Heroku and an alternative such as API Gateway coupled with Lambda functions or EC2 instances should be considered.  However, for the requirements of this system.  Heroku was suitable and met all requirements.</a:t>
             </a:r>
             <a:endParaRPr lang="en-GB" sz="1400" b="0" dirty="0"/>
           </a:p>
@@ -20483,7 +20695,7 @@
           <a:p>
             <a:r>
               <a:rPr lang="en-GB" dirty="0" smtClean="0"/>
-              <a:t>Justification of Choices	</a:t>
+              <a:t>Justification of Hosting Choices	</a:t>
             </a:r>
             <a:endParaRPr lang="en-GB" dirty="0"/>
           </a:p>
@@ -20659,7 +20871,7 @@
         <p:fade/>
       </p:transition>
     </mc:Choice>
-    <mc:Fallback xmlns:ahyp="http://schemas.microsoft.com/office/drawing/2018/hyperlinkcolor" xmlns:p15="http://schemas.microsoft.com/office/powerpoint/2012/main" xmlns:com="http://schemas.openxmlformats.org/drawingml/2006/compatibility" xmlns:pvml="urn:schemas-microsoft-com:office:powerpoint" xmlns:v="urn:schemas-microsoft-com:vml" xmlns:o="urn:schemas-microsoft-com:office:office" xmlns:dgm="http://schemas.openxmlformats.org/drawingml/2006/diagram" xmlns:c="http://schemas.openxmlformats.org/drawingml/2006/chart" xmlns:mv="urn:schemas-microsoft-com:mac:vml" xmlns="">
+    <mc:Fallback xmlns="" xmlns:mv="urn:schemas-microsoft-com:mac:vml" xmlns:c="http://schemas.openxmlformats.org/drawingml/2006/chart" xmlns:dgm="http://schemas.openxmlformats.org/drawingml/2006/diagram" xmlns:o="urn:schemas-microsoft-com:office:office" xmlns:v="urn:schemas-microsoft-com:vml" xmlns:pvml="urn:schemas-microsoft-com:office:powerpoint" xmlns:com="http://schemas.openxmlformats.org/drawingml/2006/compatibility" xmlns:p15="http://schemas.microsoft.com/office/powerpoint/2012/main" xmlns:ahyp="http://schemas.microsoft.com/office/drawing/2018/hyperlinkcolor">
       <p:transition spd="slow">
         <p:fade/>
       </p:transition>
@@ -20801,7 +21013,7 @@
         <p:fade/>
       </p:transition>
     </mc:Choice>
-    <mc:Fallback xmlns:ahyp="http://schemas.microsoft.com/office/drawing/2018/hyperlinkcolor" xmlns:p15="http://schemas.microsoft.com/office/powerpoint/2012/main" xmlns:com="http://schemas.openxmlformats.org/drawingml/2006/compatibility" xmlns:pvml="urn:schemas-microsoft-com:office:powerpoint" xmlns:v="urn:schemas-microsoft-com:vml" xmlns:o="urn:schemas-microsoft-com:office:office" xmlns:dgm="http://schemas.openxmlformats.org/drawingml/2006/diagram" xmlns:c="http://schemas.openxmlformats.org/drawingml/2006/chart" xmlns:mv="urn:schemas-microsoft-com:mac:vml" xmlns="">
+    <mc:Fallback xmlns="" xmlns:mv="urn:schemas-microsoft-com:mac:vml" xmlns:c="http://schemas.openxmlformats.org/drawingml/2006/chart" xmlns:dgm="http://schemas.openxmlformats.org/drawingml/2006/diagram" xmlns:o="urn:schemas-microsoft-com:office:office" xmlns:v="urn:schemas-microsoft-com:vml" xmlns:pvml="urn:schemas-microsoft-com:office:powerpoint" xmlns:com="http://schemas.openxmlformats.org/drawingml/2006/compatibility" xmlns:p15="http://schemas.microsoft.com/office/powerpoint/2012/main" xmlns:ahyp="http://schemas.microsoft.com/office/drawing/2018/hyperlinkcolor">
       <p:transition spd="slow">
         <p:fade/>
       </p:transition>
@@ -21883,7 +22095,7 @@
         <p:fade/>
       </p:transition>
     </mc:Choice>
-    <mc:Fallback xmlns:ahyp="http://schemas.microsoft.com/office/drawing/2018/hyperlinkcolor" xmlns:p15="http://schemas.microsoft.com/office/powerpoint/2012/main" xmlns:com="http://schemas.openxmlformats.org/drawingml/2006/compatibility" xmlns:pvml="urn:schemas-microsoft-com:office:powerpoint" xmlns:v="urn:schemas-microsoft-com:vml" xmlns:o="urn:schemas-microsoft-com:office:office" xmlns:dgm="http://schemas.openxmlformats.org/drawingml/2006/diagram" xmlns:c="http://schemas.openxmlformats.org/drawingml/2006/chart" xmlns:mv="urn:schemas-microsoft-com:mac:vml" xmlns="">
+    <mc:Fallback xmlns="" xmlns:mv="urn:schemas-microsoft-com:mac:vml" xmlns:c="http://schemas.openxmlformats.org/drawingml/2006/chart" xmlns:dgm="http://schemas.openxmlformats.org/drawingml/2006/diagram" xmlns:o="urn:schemas-microsoft-com:office:office" xmlns:v="urn:schemas-microsoft-com:vml" xmlns:pvml="urn:schemas-microsoft-com:office:powerpoint" xmlns:com="http://schemas.openxmlformats.org/drawingml/2006/compatibility" xmlns:p15="http://schemas.microsoft.com/office/powerpoint/2012/main" xmlns:ahyp="http://schemas.microsoft.com/office/drawing/2018/hyperlinkcolor">
       <p:transition spd="slow">
         <p:fade/>
       </p:transition>
@@ -22154,7 +22366,7 @@
         <p:fade/>
       </p:transition>
     </mc:Choice>
-    <mc:Fallback xmlns:ahyp="http://schemas.microsoft.com/office/drawing/2018/hyperlinkcolor" xmlns:p15="http://schemas.microsoft.com/office/powerpoint/2012/main" xmlns:com="http://schemas.openxmlformats.org/drawingml/2006/compatibility" xmlns:pvml="urn:schemas-microsoft-com:office:powerpoint" xmlns:v="urn:schemas-microsoft-com:vml" xmlns:o="urn:schemas-microsoft-com:office:office" xmlns:dgm="http://schemas.openxmlformats.org/drawingml/2006/diagram" xmlns:c="http://schemas.openxmlformats.org/drawingml/2006/chart" xmlns:mv="urn:schemas-microsoft-com:mac:vml" xmlns="">
+    <mc:Fallback xmlns="" xmlns:mv="urn:schemas-microsoft-com:mac:vml" xmlns:c="http://schemas.openxmlformats.org/drawingml/2006/chart" xmlns:dgm="http://schemas.openxmlformats.org/drawingml/2006/diagram" xmlns:o="urn:schemas-microsoft-com:office:office" xmlns:v="urn:schemas-microsoft-com:vml" xmlns:pvml="urn:schemas-microsoft-com:office:powerpoint" xmlns:com="http://schemas.openxmlformats.org/drawingml/2006/compatibility" xmlns:p15="http://schemas.microsoft.com/office/powerpoint/2012/main" xmlns:ahyp="http://schemas.microsoft.com/office/drawing/2018/hyperlinkcolor">
       <p:transition spd="slow">
         <p:fade/>
       </p:transition>
@@ -23717,7 +23929,7 @@
         <p:fade/>
       </p:transition>
     </mc:Choice>
-    <mc:Fallback xmlns:ahyp="http://schemas.microsoft.com/office/drawing/2018/hyperlinkcolor" xmlns:p15="http://schemas.microsoft.com/office/powerpoint/2012/main" xmlns:com="http://schemas.openxmlformats.org/drawingml/2006/compatibility" xmlns:pvml="urn:schemas-microsoft-com:office:powerpoint" xmlns:v="urn:schemas-microsoft-com:vml" xmlns:o="urn:schemas-microsoft-com:office:office" xmlns:dgm="http://schemas.openxmlformats.org/drawingml/2006/diagram" xmlns:c="http://schemas.openxmlformats.org/drawingml/2006/chart" xmlns:mv="urn:schemas-microsoft-com:mac:vml" xmlns="">
+    <mc:Fallback xmlns="" xmlns:mv="urn:schemas-microsoft-com:mac:vml" xmlns:c="http://schemas.openxmlformats.org/drawingml/2006/chart" xmlns:dgm="http://schemas.openxmlformats.org/drawingml/2006/diagram" xmlns:o="urn:schemas-microsoft-com:office:office" xmlns:v="urn:schemas-microsoft-com:vml" xmlns:pvml="urn:schemas-microsoft-com:office:powerpoint" xmlns:com="http://schemas.openxmlformats.org/drawingml/2006/compatibility" xmlns:p15="http://schemas.microsoft.com/office/powerpoint/2012/main" xmlns:ahyp="http://schemas.microsoft.com/office/drawing/2018/hyperlinkcolor">
       <p:transition spd="slow">
         <p:fade/>
       </p:transition>

</xml_diff>

<commit_message>
Python files updated with comments and explanation
</commit_message>
<xml_diff>
--- a/Microservices Architecture.pptx
+++ b/Microservices Architecture.pptx
@@ -5,7 +5,7 @@
     <p:sldMasterId id="2147483677" r:id="rId1"/>
   </p:sldMasterIdLst>
   <p:notesMasterIdLst>
-    <p:notesMasterId r:id="rId21"/>
+    <p:notesMasterId r:id="rId22"/>
   </p:notesMasterIdLst>
   <p:sldIdLst>
     <p:sldId id="260" r:id="rId2"/>
@@ -17,16 +17,17 @@
     <p:sldId id="305" r:id="rId8"/>
     <p:sldId id="306" r:id="rId9"/>
     <p:sldId id="307" r:id="rId10"/>
-    <p:sldId id="308" r:id="rId11"/>
-    <p:sldId id="309" r:id="rId12"/>
-    <p:sldId id="316" r:id="rId13"/>
-    <p:sldId id="310" r:id="rId14"/>
-    <p:sldId id="311" r:id="rId15"/>
-    <p:sldId id="317" r:id="rId16"/>
-    <p:sldId id="303" r:id="rId17"/>
-    <p:sldId id="312" r:id="rId18"/>
-    <p:sldId id="302" r:id="rId19"/>
-    <p:sldId id="304" r:id="rId20"/>
+    <p:sldId id="318" r:id="rId11"/>
+    <p:sldId id="308" r:id="rId12"/>
+    <p:sldId id="309" r:id="rId13"/>
+    <p:sldId id="316" r:id="rId14"/>
+    <p:sldId id="310" r:id="rId15"/>
+    <p:sldId id="311" r:id="rId16"/>
+    <p:sldId id="317" r:id="rId17"/>
+    <p:sldId id="303" r:id="rId18"/>
+    <p:sldId id="312" r:id="rId19"/>
+    <p:sldId id="302" r:id="rId20"/>
+    <p:sldId id="304" r:id="rId21"/>
   </p:sldIdLst>
   <p:sldSz cx="14630400" cy="8229600"/>
   <p:notesSz cx="6858000" cy="9144000"/>
@@ -4585,7 +4586,7 @@
         <p:fade/>
       </p:transition>
     </mc:Choice>
-    <mc:Fallback xmlns="" xmlns:mv="urn:schemas-microsoft-com:mac:vml" xmlns:c="http://schemas.openxmlformats.org/drawingml/2006/chart" xmlns:dgm="http://schemas.openxmlformats.org/drawingml/2006/diagram" xmlns:o="urn:schemas-microsoft-com:office:office" xmlns:v="urn:schemas-microsoft-com:vml" xmlns:pvml="urn:schemas-microsoft-com:office:powerpoint" xmlns:com="http://schemas.openxmlformats.org/drawingml/2006/compatibility" xmlns:p15="http://schemas.microsoft.com/office/powerpoint/2012/main" xmlns:ahyp="http://schemas.microsoft.com/office/drawing/2018/hyperlinkcolor">
+    <mc:Fallback xmlns:ahyp="http://schemas.microsoft.com/office/drawing/2018/hyperlinkcolor" xmlns:p15="http://schemas.microsoft.com/office/powerpoint/2012/main" xmlns:com="http://schemas.openxmlformats.org/drawingml/2006/compatibility" xmlns:pvml="urn:schemas-microsoft-com:office:powerpoint" xmlns:v="urn:schemas-microsoft-com:vml" xmlns:o="urn:schemas-microsoft-com:office:office" xmlns:dgm="http://schemas.openxmlformats.org/drawingml/2006/diagram" xmlns:c="http://schemas.openxmlformats.org/drawingml/2006/chart" xmlns:mv="urn:schemas-microsoft-com:mac:vml" xmlns="">
       <p:transition spd="slow">
         <p:fade/>
       </p:transition>
@@ -4930,7 +4931,7 @@
         <p:fade/>
       </p:transition>
     </mc:Choice>
-    <mc:Fallback xmlns="" xmlns:mv="urn:schemas-microsoft-com:mac:vml" xmlns:c="http://schemas.openxmlformats.org/drawingml/2006/chart" xmlns:dgm="http://schemas.openxmlformats.org/drawingml/2006/diagram" xmlns:o="urn:schemas-microsoft-com:office:office" xmlns:v="urn:schemas-microsoft-com:vml" xmlns:pvml="urn:schemas-microsoft-com:office:powerpoint" xmlns:com="http://schemas.openxmlformats.org/drawingml/2006/compatibility" xmlns:p15="http://schemas.microsoft.com/office/powerpoint/2012/main" xmlns:ahyp="http://schemas.microsoft.com/office/drawing/2018/hyperlinkcolor">
+    <mc:Fallback xmlns:ahyp="http://schemas.microsoft.com/office/drawing/2018/hyperlinkcolor" xmlns:p15="http://schemas.microsoft.com/office/powerpoint/2012/main" xmlns:com="http://schemas.openxmlformats.org/drawingml/2006/compatibility" xmlns:pvml="urn:schemas-microsoft-com:office:powerpoint" xmlns:v="urn:schemas-microsoft-com:vml" xmlns:o="urn:schemas-microsoft-com:office:office" xmlns:dgm="http://schemas.openxmlformats.org/drawingml/2006/diagram" xmlns:c="http://schemas.openxmlformats.org/drawingml/2006/chart" xmlns:mv="urn:schemas-microsoft-com:mac:vml" xmlns="">
       <p:transition spd="slow">
         <p:fade/>
       </p:transition>
@@ -6294,7 +6295,7 @@
         <p:fade/>
       </p:transition>
     </mc:Choice>
-    <mc:Fallback xmlns="" xmlns:mv="urn:schemas-microsoft-com:mac:vml" xmlns:c="http://schemas.openxmlformats.org/drawingml/2006/chart" xmlns:dgm="http://schemas.openxmlformats.org/drawingml/2006/diagram" xmlns:o="urn:schemas-microsoft-com:office:office" xmlns:v="urn:schemas-microsoft-com:vml" xmlns:pvml="urn:schemas-microsoft-com:office:powerpoint" xmlns:com="http://schemas.openxmlformats.org/drawingml/2006/compatibility" xmlns:p15="http://schemas.microsoft.com/office/powerpoint/2012/main" xmlns:ahyp="http://schemas.microsoft.com/office/drawing/2018/hyperlinkcolor">
+    <mc:Fallback xmlns:ahyp="http://schemas.microsoft.com/office/drawing/2018/hyperlinkcolor" xmlns:p15="http://schemas.microsoft.com/office/powerpoint/2012/main" xmlns:com="http://schemas.openxmlformats.org/drawingml/2006/compatibility" xmlns:pvml="urn:schemas-microsoft-com:office:powerpoint" xmlns:v="urn:schemas-microsoft-com:vml" xmlns:o="urn:schemas-microsoft-com:office:office" xmlns:dgm="http://schemas.openxmlformats.org/drawingml/2006/diagram" xmlns:c="http://schemas.openxmlformats.org/drawingml/2006/chart" xmlns:mv="urn:schemas-microsoft-com:mac:vml" xmlns="">
       <p:transition spd="slow">
         <p:fade/>
       </p:transition>
@@ -6636,7 +6637,7 @@
         <p:fade/>
       </p:transition>
     </mc:Choice>
-    <mc:Fallback xmlns="" xmlns:mv="urn:schemas-microsoft-com:mac:vml" xmlns:c="http://schemas.openxmlformats.org/drawingml/2006/chart" xmlns:dgm="http://schemas.openxmlformats.org/drawingml/2006/diagram" xmlns:o="urn:schemas-microsoft-com:office:office" xmlns:v="urn:schemas-microsoft-com:vml" xmlns:pvml="urn:schemas-microsoft-com:office:powerpoint" xmlns:com="http://schemas.openxmlformats.org/drawingml/2006/compatibility" xmlns:p15="http://schemas.microsoft.com/office/powerpoint/2012/main" xmlns:ahyp="http://schemas.microsoft.com/office/drawing/2018/hyperlinkcolor">
+    <mc:Fallback xmlns:ahyp="http://schemas.microsoft.com/office/drawing/2018/hyperlinkcolor" xmlns:p15="http://schemas.microsoft.com/office/powerpoint/2012/main" xmlns:com="http://schemas.openxmlformats.org/drawingml/2006/compatibility" xmlns:pvml="urn:schemas-microsoft-com:office:powerpoint" xmlns:v="urn:schemas-microsoft-com:vml" xmlns:o="urn:schemas-microsoft-com:office:office" xmlns:dgm="http://schemas.openxmlformats.org/drawingml/2006/diagram" xmlns:c="http://schemas.openxmlformats.org/drawingml/2006/chart" xmlns:mv="urn:schemas-microsoft-com:mac:vml" xmlns="">
       <p:transition spd="slow">
         <p:fade/>
       </p:transition>
@@ -7298,7 +7299,7 @@
         <p:fade/>
       </p:transition>
     </mc:Choice>
-    <mc:Fallback xmlns="" xmlns:mv="urn:schemas-microsoft-com:mac:vml" xmlns:c="http://schemas.openxmlformats.org/drawingml/2006/chart" xmlns:dgm="http://schemas.openxmlformats.org/drawingml/2006/diagram" xmlns:o="urn:schemas-microsoft-com:office:office" xmlns:v="urn:schemas-microsoft-com:vml" xmlns:pvml="urn:schemas-microsoft-com:office:powerpoint" xmlns:com="http://schemas.openxmlformats.org/drawingml/2006/compatibility" xmlns:p15="http://schemas.microsoft.com/office/powerpoint/2012/main" xmlns:ahyp="http://schemas.microsoft.com/office/drawing/2018/hyperlinkcolor">
+    <mc:Fallback xmlns:ahyp="http://schemas.microsoft.com/office/drawing/2018/hyperlinkcolor" xmlns:p15="http://schemas.microsoft.com/office/powerpoint/2012/main" xmlns:com="http://schemas.openxmlformats.org/drawingml/2006/compatibility" xmlns:pvml="urn:schemas-microsoft-com:office:powerpoint" xmlns:v="urn:schemas-microsoft-com:vml" xmlns:o="urn:schemas-microsoft-com:office:office" xmlns:dgm="http://schemas.openxmlformats.org/drawingml/2006/diagram" xmlns:c="http://schemas.openxmlformats.org/drawingml/2006/chart" xmlns:mv="urn:schemas-microsoft-com:mac:vml" xmlns="">
       <p:transition spd="slow">
         <p:fade/>
       </p:transition>
@@ -8235,7 +8236,7 @@
         <p:fade/>
       </p:transition>
     </mc:Choice>
-    <mc:Fallback xmlns="" xmlns:mv="urn:schemas-microsoft-com:mac:vml" xmlns:c="http://schemas.openxmlformats.org/drawingml/2006/chart" xmlns:dgm="http://schemas.openxmlformats.org/drawingml/2006/diagram" xmlns:o="urn:schemas-microsoft-com:office:office" xmlns:v="urn:schemas-microsoft-com:vml" xmlns:pvml="urn:schemas-microsoft-com:office:powerpoint" xmlns:com="http://schemas.openxmlformats.org/drawingml/2006/compatibility" xmlns:p15="http://schemas.microsoft.com/office/powerpoint/2012/main" xmlns:ahyp="http://schemas.microsoft.com/office/drawing/2018/hyperlinkcolor">
+    <mc:Fallback xmlns:ahyp="http://schemas.microsoft.com/office/drawing/2018/hyperlinkcolor" xmlns:p15="http://schemas.microsoft.com/office/powerpoint/2012/main" xmlns:com="http://schemas.openxmlformats.org/drawingml/2006/compatibility" xmlns:pvml="urn:schemas-microsoft-com:office:powerpoint" xmlns:v="urn:schemas-microsoft-com:vml" xmlns:o="urn:schemas-microsoft-com:office:office" xmlns:dgm="http://schemas.openxmlformats.org/drawingml/2006/diagram" xmlns:c="http://schemas.openxmlformats.org/drawingml/2006/chart" xmlns:mv="urn:schemas-microsoft-com:mac:vml" xmlns="">
       <p:transition spd="slow">
         <p:fade/>
       </p:transition>
@@ -9572,7 +9573,7 @@
         <p:fade/>
       </p:transition>
     </mc:Choice>
-    <mc:Fallback xmlns="" xmlns:mv="urn:schemas-microsoft-com:mac:vml" xmlns:c="http://schemas.openxmlformats.org/drawingml/2006/chart" xmlns:dgm="http://schemas.openxmlformats.org/drawingml/2006/diagram" xmlns:o="urn:schemas-microsoft-com:office:office" xmlns:v="urn:schemas-microsoft-com:vml" xmlns:pvml="urn:schemas-microsoft-com:office:powerpoint" xmlns:com="http://schemas.openxmlformats.org/drawingml/2006/compatibility" xmlns:p15="http://schemas.microsoft.com/office/powerpoint/2012/main" xmlns:ahyp="http://schemas.microsoft.com/office/drawing/2018/hyperlinkcolor">
+    <mc:Fallback xmlns:ahyp="http://schemas.microsoft.com/office/drawing/2018/hyperlinkcolor" xmlns:p15="http://schemas.microsoft.com/office/powerpoint/2012/main" xmlns:com="http://schemas.openxmlformats.org/drawingml/2006/compatibility" xmlns:pvml="urn:schemas-microsoft-com:office:powerpoint" xmlns:v="urn:schemas-microsoft-com:vml" xmlns:o="urn:schemas-microsoft-com:office:office" xmlns:dgm="http://schemas.openxmlformats.org/drawingml/2006/diagram" xmlns:c="http://schemas.openxmlformats.org/drawingml/2006/chart" xmlns:mv="urn:schemas-microsoft-com:mac:vml" xmlns="">
       <p:transition spd="slow">
         <p:fade/>
       </p:transition>
@@ -10990,7 +10991,7 @@
         <p:fade/>
       </p:transition>
     </mc:Choice>
-    <mc:Fallback xmlns="" xmlns:mv="urn:schemas-microsoft-com:mac:vml" xmlns:c="http://schemas.openxmlformats.org/drawingml/2006/chart" xmlns:dgm="http://schemas.openxmlformats.org/drawingml/2006/diagram" xmlns:o="urn:schemas-microsoft-com:office:office" xmlns:v="urn:schemas-microsoft-com:vml" xmlns:pvml="urn:schemas-microsoft-com:office:powerpoint" xmlns:com="http://schemas.openxmlformats.org/drawingml/2006/compatibility" xmlns:p15="http://schemas.microsoft.com/office/powerpoint/2012/main" xmlns:ahyp="http://schemas.microsoft.com/office/drawing/2018/hyperlinkcolor">
+    <mc:Fallback xmlns:ahyp="http://schemas.microsoft.com/office/drawing/2018/hyperlinkcolor" xmlns:p15="http://schemas.microsoft.com/office/powerpoint/2012/main" xmlns:com="http://schemas.openxmlformats.org/drawingml/2006/compatibility" xmlns:pvml="urn:schemas-microsoft-com:office:powerpoint" xmlns:v="urn:schemas-microsoft-com:vml" xmlns:o="urn:schemas-microsoft-com:office:office" xmlns:dgm="http://schemas.openxmlformats.org/drawingml/2006/diagram" xmlns:c="http://schemas.openxmlformats.org/drawingml/2006/chart" xmlns:mv="urn:schemas-microsoft-com:mac:vml" xmlns="">
       <p:transition spd="slow">
         <p:fade/>
       </p:transition>
@@ -11879,7 +11880,7 @@
         <p:fade/>
       </p:transition>
     </mc:Choice>
-    <mc:Fallback xmlns="" xmlns:mv="urn:schemas-microsoft-com:mac:vml" xmlns:c="http://schemas.openxmlformats.org/drawingml/2006/chart" xmlns:dgm="http://schemas.openxmlformats.org/drawingml/2006/diagram" xmlns:o="urn:schemas-microsoft-com:office:office" xmlns:v="urn:schemas-microsoft-com:vml" xmlns:pvml="urn:schemas-microsoft-com:office:powerpoint" xmlns:com="http://schemas.openxmlformats.org/drawingml/2006/compatibility" xmlns:p15="http://schemas.microsoft.com/office/powerpoint/2012/main" xmlns:ahyp="http://schemas.microsoft.com/office/drawing/2018/hyperlinkcolor">
+    <mc:Fallback xmlns:ahyp="http://schemas.microsoft.com/office/drawing/2018/hyperlinkcolor" xmlns:p15="http://schemas.microsoft.com/office/powerpoint/2012/main" xmlns:com="http://schemas.openxmlformats.org/drawingml/2006/compatibility" xmlns:pvml="urn:schemas-microsoft-com:office:powerpoint" xmlns:v="urn:schemas-microsoft-com:vml" xmlns:o="urn:schemas-microsoft-com:office:office" xmlns:dgm="http://schemas.openxmlformats.org/drawingml/2006/diagram" xmlns:c="http://schemas.openxmlformats.org/drawingml/2006/chart" xmlns:mv="urn:schemas-microsoft-com:mac:vml" xmlns="">
       <p:transition spd="slow">
         <p:fade/>
       </p:transition>
@@ -11896,6 +11897,109 @@
 </file>
 
 <file path=ppt/slides/slide10.xml><?xml version="1.0" encoding="utf-8"?>
+<p:sld xmlns:a="http://schemas.openxmlformats.org/drawingml/2006/main" xmlns:r="http://schemas.openxmlformats.org/officeDocument/2006/relationships" xmlns:p="http://schemas.openxmlformats.org/presentationml/2006/main">
+  <p:cSld>
+    <p:spTree>
+      <p:nvGrpSpPr>
+        <p:cNvPr id="1" name=""/>
+        <p:cNvGrpSpPr/>
+        <p:nvPr/>
+      </p:nvGrpSpPr>
+      <p:grpSpPr>
+        <a:xfrm>
+          <a:off x="0" y="0"/>
+          <a:ext cx="0" cy="0"/>
+          <a:chOff x="0" y="0"/>
+          <a:chExt cx="0" cy="0"/>
+        </a:xfrm>
+      </p:grpSpPr>
+      <p:sp>
+        <p:nvSpPr>
+          <p:cNvPr id="5" name="Title 4"/>
+          <p:cNvSpPr>
+            <a:spLocks noGrp="1"/>
+          </p:cNvSpPr>
+          <p:nvPr>
+            <p:ph type="title"/>
+          </p:nvPr>
+        </p:nvSpPr>
+        <p:spPr/>
+        <p:txBody>
+          <a:bodyPr/>
+          <a:lstStyle/>
+          <a:p>
+            <a:r>
+              <a:rPr lang="en-GB" dirty="0" smtClean="0"/>
+              <a:t>Microservice 2 Lambda Code</a:t>
+            </a:r>
+            <a:endParaRPr lang="en-GB" dirty="0"/>
+          </a:p>
+        </p:txBody>
+      </p:sp>
+      <p:pic>
+        <p:nvPicPr>
+          <p:cNvPr id="6" name="Picture 5"/>
+          <p:cNvPicPr>
+            <a:picLocks noChangeAspect="1"/>
+          </p:cNvPicPr>
+          <p:nvPr/>
+        </p:nvPicPr>
+        <p:blipFill>
+          <a:blip r:embed="rId2"/>
+          <a:stretch>
+            <a:fillRect/>
+          </a:stretch>
+        </p:blipFill>
+        <p:spPr>
+          <a:xfrm>
+            <a:off x="1407834" y="2057399"/>
+            <a:ext cx="8161874" cy="3056572"/>
+          </a:xfrm>
+          <a:prstGeom prst="rect">
+            <a:avLst/>
+          </a:prstGeom>
+          <a:ln w="38100" cap="sq">
+            <a:solidFill>
+              <a:srgbClr val="000000"/>
+            </a:solidFill>
+            <a:prstDash val="solid"/>
+            <a:miter lim="800000"/>
+          </a:ln>
+          <a:effectLst>
+            <a:outerShdw blurRad="50800" dist="38100" dir="2700000" algn="tl" rotWithShape="0">
+              <a:srgbClr val="000000">
+                <a:alpha val="43000"/>
+              </a:srgbClr>
+            </a:outerShdw>
+          </a:effectLst>
+        </p:spPr>
+      </p:pic>
+    </p:spTree>
+    <p:extLst>
+      <p:ext uri="{BB962C8B-B14F-4D97-AF65-F5344CB8AC3E}">
+        <p14:creationId xmlns:p14="http://schemas.microsoft.com/office/powerpoint/2010/main" val="3997021714"/>
+      </p:ext>
+    </p:extLst>
+  </p:cSld>
+  <p:clrMapOvr>
+    <a:masterClrMapping/>
+  </p:clrMapOvr>
+  <mc:AlternateContent xmlns:mc="http://schemas.openxmlformats.org/markup-compatibility/2006" xmlns:p14="http://schemas.microsoft.com/office/powerpoint/2010/main">
+    <mc:Choice Requires="p14">
+      <p:transition spd="med" p14:dur="700">
+        <p:fade/>
+      </p:transition>
+    </mc:Choice>
+    <mc:Fallback xmlns:ahyp="http://schemas.microsoft.com/office/drawing/2018/hyperlinkcolor" xmlns:p15="http://schemas.microsoft.com/office/powerpoint/2012/main" xmlns:com="http://schemas.openxmlformats.org/drawingml/2006/compatibility" xmlns:pvml="urn:schemas-microsoft-com:office:powerpoint" xmlns:v="urn:schemas-microsoft-com:vml" xmlns:o="urn:schemas-microsoft-com:office:office" xmlns:dgm="http://schemas.openxmlformats.org/drawingml/2006/diagram" xmlns:c="http://schemas.openxmlformats.org/drawingml/2006/chart" xmlns:mv="urn:schemas-microsoft-com:mac:vml" xmlns="">
+      <p:transition spd="slow">
+        <p:fade/>
+      </p:transition>
+    </mc:Fallback>
+  </mc:AlternateContent>
+</p:sld>
+</file>
+
+<file path=ppt/slides/slide11.xml><?xml version="1.0" encoding="utf-8"?>
 <p:sld xmlns:a="http://schemas.openxmlformats.org/drawingml/2006/main" xmlns:r="http://schemas.openxmlformats.org/officeDocument/2006/relationships" xmlns:p="http://schemas.openxmlformats.org/presentationml/2006/main">
   <p:cSld>
     <p:spTree>
@@ -12033,7 +12137,7 @@
         <p:fade/>
       </p:transition>
     </mc:Choice>
-    <mc:Fallback xmlns="" xmlns:mv="urn:schemas-microsoft-com:mac:vml" xmlns:c="http://schemas.openxmlformats.org/drawingml/2006/chart" xmlns:dgm="http://schemas.openxmlformats.org/drawingml/2006/diagram" xmlns:o="urn:schemas-microsoft-com:office:office" xmlns:v="urn:schemas-microsoft-com:vml" xmlns:pvml="urn:schemas-microsoft-com:office:powerpoint" xmlns:com="http://schemas.openxmlformats.org/drawingml/2006/compatibility" xmlns:p15="http://schemas.microsoft.com/office/powerpoint/2012/main" xmlns:ahyp="http://schemas.microsoft.com/office/drawing/2018/hyperlinkcolor">
+    <mc:Fallback xmlns:ahyp="http://schemas.microsoft.com/office/drawing/2018/hyperlinkcolor" xmlns:p15="http://schemas.microsoft.com/office/powerpoint/2012/main" xmlns:com="http://schemas.openxmlformats.org/drawingml/2006/compatibility" xmlns:pvml="urn:schemas-microsoft-com:office:powerpoint" xmlns:v="urn:schemas-microsoft-com:vml" xmlns:o="urn:schemas-microsoft-com:office:office" xmlns:dgm="http://schemas.openxmlformats.org/drawingml/2006/diagram" xmlns:c="http://schemas.openxmlformats.org/drawingml/2006/chart" xmlns:mv="urn:schemas-microsoft-com:mac:vml" xmlns="">
       <p:transition spd="slow">
         <p:fade/>
       </p:transition>
@@ -12049,7 +12153,7 @@
 </p:sld>
 </file>
 
-<file path=ppt/slides/slide11.xml><?xml version="1.0" encoding="utf-8"?>
+<file path=ppt/slides/slide12.xml><?xml version="1.0" encoding="utf-8"?>
 <p:sld xmlns:a="http://schemas.openxmlformats.org/drawingml/2006/main" xmlns:r="http://schemas.openxmlformats.org/officeDocument/2006/relationships" xmlns:p="http://schemas.openxmlformats.org/presentationml/2006/main">
   <p:cSld>
     <p:spTree>
@@ -13167,7 +13271,7 @@
         <p:fade/>
       </p:transition>
     </mc:Choice>
-    <mc:Fallback xmlns="" xmlns:mv="urn:schemas-microsoft-com:mac:vml" xmlns:c="http://schemas.openxmlformats.org/drawingml/2006/chart" xmlns:dgm="http://schemas.openxmlformats.org/drawingml/2006/diagram" xmlns:o="urn:schemas-microsoft-com:office:office" xmlns:v="urn:schemas-microsoft-com:vml" xmlns:pvml="urn:schemas-microsoft-com:office:powerpoint" xmlns:com="http://schemas.openxmlformats.org/drawingml/2006/compatibility" xmlns:p15="http://schemas.microsoft.com/office/powerpoint/2012/main" xmlns:ahyp="http://schemas.microsoft.com/office/drawing/2018/hyperlinkcolor">
+    <mc:Fallback xmlns:ahyp="http://schemas.microsoft.com/office/drawing/2018/hyperlinkcolor" xmlns:p15="http://schemas.microsoft.com/office/powerpoint/2012/main" xmlns:com="http://schemas.openxmlformats.org/drawingml/2006/compatibility" xmlns:pvml="urn:schemas-microsoft-com:office:powerpoint" xmlns:v="urn:schemas-microsoft-com:vml" xmlns:o="urn:schemas-microsoft-com:office:office" xmlns:dgm="http://schemas.openxmlformats.org/drawingml/2006/diagram" xmlns:c="http://schemas.openxmlformats.org/drawingml/2006/chart" xmlns:mv="urn:schemas-microsoft-com:mac:vml" xmlns="">
       <p:transition spd="slow">
         <p:fade/>
       </p:transition>
@@ -13328,7 +13432,7 @@
 </p:sld>
 </file>
 
-<file path=ppt/slides/slide12.xml><?xml version="1.0" encoding="utf-8"?>
+<file path=ppt/slides/slide13.xml><?xml version="1.0" encoding="utf-8"?>
 <p:sld xmlns:a="http://schemas.openxmlformats.org/drawingml/2006/main" xmlns:r="http://schemas.openxmlformats.org/officeDocument/2006/relationships" xmlns:p="http://schemas.openxmlformats.org/presentationml/2006/main">
   <p:cSld>
     <p:spTree>
@@ -13370,7 +13474,7 @@
       </p:sp>
       <p:pic>
         <p:nvPicPr>
-          <p:cNvPr id="2" name="Picture 1"/>
+          <p:cNvPr id="3" name="Picture 2"/>
           <p:cNvPicPr>
             <a:picLocks noChangeAspect="1"/>
           </p:cNvPicPr>
@@ -13384,8 +13488,8 @@
         </p:blipFill>
         <p:spPr>
           <a:xfrm>
-            <a:off x="1004878" y="1348581"/>
-            <a:ext cx="9578178" cy="5901437"/>
+            <a:off x="1969711" y="1550730"/>
+            <a:ext cx="9327553" cy="4957600"/>
           </a:xfrm>
           <a:prstGeom prst="rect">
             <a:avLst/>
@@ -13422,7 +13526,7 @@
         <p:fade/>
       </p:transition>
     </mc:Choice>
-    <mc:Fallback xmlns="" xmlns:mv="urn:schemas-microsoft-com:mac:vml" xmlns:c="http://schemas.openxmlformats.org/drawingml/2006/chart" xmlns:dgm="http://schemas.openxmlformats.org/drawingml/2006/diagram" xmlns:o="urn:schemas-microsoft-com:office:office" xmlns:v="urn:schemas-microsoft-com:vml" xmlns:pvml="urn:schemas-microsoft-com:office:powerpoint" xmlns:com="http://schemas.openxmlformats.org/drawingml/2006/compatibility" xmlns:p15="http://schemas.microsoft.com/office/powerpoint/2012/main" xmlns:ahyp="http://schemas.microsoft.com/office/drawing/2018/hyperlinkcolor">
+    <mc:Fallback xmlns:ahyp="http://schemas.microsoft.com/office/drawing/2018/hyperlinkcolor" xmlns:p15="http://schemas.microsoft.com/office/powerpoint/2012/main" xmlns:com="http://schemas.openxmlformats.org/drawingml/2006/compatibility" xmlns:pvml="urn:schemas-microsoft-com:office:powerpoint" xmlns:v="urn:schemas-microsoft-com:vml" xmlns:o="urn:schemas-microsoft-com:office:office" xmlns:dgm="http://schemas.openxmlformats.org/drawingml/2006/diagram" xmlns:c="http://schemas.openxmlformats.org/drawingml/2006/chart" xmlns:mv="urn:schemas-microsoft-com:mac:vml" xmlns="">
       <p:transition spd="slow">
         <p:fade/>
       </p:transition>
@@ -13431,7 +13535,7 @@
 </p:sld>
 </file>
 
-<file path=ppt/slides/slide13.xml><?xml version="1.0" encoding="utf-8"?>
+<file path=ppt/slides/slide14.xml><?xml version="1.0" encoding="utf-8"?>
 <p:sld xmlns:a="http://schemas.openxmlformats.org/drawingml/2006/main" xmlns:r="http://schemas.openxmlformats.org/officeDocument/2006/relationships" xmlns:p="http://schemas.openxmlformats.org/presentationml/2006/main">
   <p:cSld>
     <p:spTree>
@@ -13573,7 +13677,7 @@
         <p:fade/>
       </p:transition>
     </mc:Choice>
-    <mc:Fallback xmlns="" xmlns:mv="urn:schemas-microsoft-com:mac:vml" xmlns:c="http://schemas.openxmlformats.org/drawingml/2006/chart" xmlns:dgm="http://schemas.openxmlformats.org/drawingml/2006/diagram" xmlns:o="urn:schemas-microsoft-com:office:office" xmlns:v="urn:schemas-microsoft-com:vml" xmlns:pvml="urn:schemas-microsoft-com:office:powerpoint" xmlns:com="http://schemas.openxmlformats.org/drawingml/2006/compatibility" xmlns:p15="http://schemas.microsoft.com/office/powerpoint/2012/main" xmlns:ahyp="http://schemas.microsoft.com/office/drawing/2018/hyperlinkcolor">
+    <mc:Fallback xmlns:ahyp="http://schemas.microsoft.com/office/drawing/2018/hyperlinkcolor" xmlns:p15="http://schemas.microsoft.com/office/powerpoint/2012/main" xmlns:com="http://schemas.openxmlformats.org/drawingml/2006/compatibility" xmlns:pvml="urn:schemas-microsoft-com:office:powerpoint" xmlns:v="urn:schemas-microsoft-com:vml" xmlns:o="urn:schemas-microsoft-com:office:office" xmlns:dgm="http://schemas.openxmlformats.org/drawingml/2006/diagram" xmlns:c="http://schemas.openxmlformats.org/drawingml/2006/chart" xmlns:mv="urn:schemas-microsoft-com:mac:vml" xmlns="">
       <p:transition spd="slow">
         <p:fade/>
       </p:transition>
@@ -13589,7 +13693,7 @@
 </p:sld>
 </file>
 
-<file path=ppt/slides/slide14.xml><?xml version="1.0" encoding="utf-8"?>
+<file path=ppt/slides/slide15.xml><?xml version="1.0" encoding="utf-8"?>
 <p:sld xmlns:a="http://schemas.openxmlformats.org/drawingml/2006/main" xmlns:r="http://schemas.openxmlformats.org/officeDocument/2006/relationships" xmlns:p="http://schemas.openxmlformats.org/presentationml/2006/main">
   <p:cSld>
     <p:spTree>
@@ -14650,7 +14754,7 @@
         <p:fade/>
       </p:transition>
     </mc:Choice>
-    <mc:Fallback xmlns="" xmlns:mv="urn:schemas-microsoft-com:mac:vml" xmlns:c="http://schemas.openxmlformats.org/drawingml/2006/chart" xmlns:dgm="http://schemas.openxmlformats.org/drawingml/2006/diagram" xmlns:o="urn:schemas-microsoft-com:office:office" xmlns:v="urn:schemas-microsoft-com:vml" xmlns:pvml="urn:schemas-microsoft-com:office:powerpoint" xmlns:com="http://schemas.openxmlformats.org/drawingml/2006/compatibility" xmlns:p15="http://schemas.microsoft.com/office/powerpoint/2012/main" xmlns:ahyp="http://schemas.microsoft.com/office/drawing/2018/hyperlinkcolor">
+    <mc:Fallback xmlns:ahyp="http://schemas.microsoft.com/office/drawing/2018/hyperlinkcolor" xmlns:p15="http://schemas.microsoft.com/office/powerpoint/2012/main" xmlns:com="http://schemas.openxmlformats.org/drawingml/2006/compatibility" xmlns:pvml="urn:schemas-microsoft-com:office:powerpoint" xmlns:v="urn:schemas-microsoft-com:vml" xmlns:o="urn:schemas-microsoft-com:office:office" xmlns:dgm="http://schemas.openxmlformats.org/drawingml/2006/diagram" xmlns:c="http://schemas.openxmlformats.org/drawingml/2006/chart" xmlns:mv="urn:schemas-microsoft-com:mac:vml" xmlns="">
       <p:transition spd="slow">
         <p:fade/>
       </p:transition>
@@ -14783,7 +14887,7 @@
 </p:sld>
 </file>
 
-<file path=ppt/slides/slide15.xml><?xml version="1.0" encoding="utf-8"?>
+<file path=ppt/slides/slide16.xml><?xml version="1.0" encoding="utf-8"?>
 <p:sld xmlns:a="http://schemas.openxmlformats.org/drawingml/2006/main" xmlns:r="http://schemas.openxmlformats.org/officeDocument/2006/relationships" xmlns:p="http://schemas.openxmlformats.org/presentationml/2006/main">
   <p:cSld>
     <p:spTree>
@@ -14825,7 +14929,7 @@
       </p:sp>
       <p:pic>
         <p:nvPicPr>
-          <p:cNvPr id="4" name="Picture 3"/>
+          <p:cNvPr id="2" name="Picture 1"/>
           <p:cNvPicPr>
             <a:picLocks noChangeAspect="1"/>
           </p:cNvPicPr>
@@ -14839,8 +14943,8 @@
         </p:blipFill>
         <p:spPr>
           <a:xfrm>
-            <a:off x="1019892" y="1258640"/>
-            <a:ext cx="8971051" cy="6208812"/>
+            <a:off x="1673289" y="1278912"/>
+            <a:ext cx="8222879" cy="5857843"/>
           </a:xfrm>
           <a:prstGeom prst="rect">
             <a:avLst/>
@@ -14877,7 +14981,7 @@
         <p:fade/>
       </p:transition>
     </mc:Choice>
-    <mc:Fallback xmlns="" xmlns:mv="urn:schemas-microsoft-com:mac:vml" xmlns:c="http://schemas.openxmlformats.org/drawingml/2006/chart" xmlns:dgm="http://schemas.openxmlformats.org/drawingml/2006/diagram" xmlns:o="urn:schemas-microsoft-com:office:office" xmlns:v="urn:schemas-microsoft-com:vml" xmlns:pvml="urn:schemas-microsoft-com:office:powerpoint" xmlns:com="http://schemas.openxmlformats.org/drawingml/2006/compatibility" xmlns:p15="http://schemas.microsoft.com/office/powerpoint/2012/main" xmlns:ahyp="http://schemas.microsoft.com/office/drawing/2018/hyperlinkcolor">
+    <mc:Fallback xmlns:ahyp="http://schemas.microsoft.com/office/drawing/2018/hyperlinkcolor" xmlns:p15="http://schemas.microsoft.com/office/powerpoint/2012/main" xmlns:com="http://schemas.openxmlformats.org/drawingml/2006/compatibility" xmlns:pvml="urn:schemas-microsoft-com:office:powerpoint" xmlns:v="urn:schemas-microsoft-com:vml" xmlns:o="urn:schemas-microsoft-com:office:office" xmlns:dgm="http://schemas.openxmlformats.org/drawingml/2006/diagram" xmlns:c="http://schemas.openxmlformats.org/drawingml/2006/chart" xmlns:mv="urn:schemas-microsoft-com:mac:vml" xmlns="">
       <p:transition spd="slow">
         <p:fade/>
       </p:transition>
@@ -14886,7 +14990,7 @@
 </p:sld>
 </file>
 
-<file path=ppt/slides/slide16.xml><?xml version="1.0" encoding="utf-8"?>
+<file path=ppt/slides/slide17.xml><?xml version="1.0" encoding="utf-8"?>
 <p:sld xmlns:a="http://schemas.openxmlformats.org/drawingml/2006/main" xmlns:r="http://schemas.openxmlformats.org/officeDocument/2006/relationships" xmlns:p="http://schemas.openxmlformats.org/presentationml/2006/main">
   <p:cSld>
     <p:spTree>
@@ -14968,7 +15072,7 @@
         <p:fade/>
       </p:transition>
     </mc:Choice>
-    <mc:Fallback xmlns="" xmlns:mv="urn:schemas-microsoft-com:mac:vml" xmlns:c="http://schemas.openxmlformats.org/drawingml/2006/chart" xmlns:dgm="http://schemas.openxmlformats.org/drawingml/2006/diagram" xmlns:o="urn:schemas-microsoft-com:office:office" xmlns:v="urn:schemas-microsoft-com:vml" xmlns:pvml="urn:schemas-microsoft-com:office:powerpoint" xmlns:com="http://schemas.openxmlformats.org/drawingml/2006/compatibility" xmlns:p15="http://schemas.microsoft.com/office/powerpoint/2012/main" xmlns:ahyp="http://schemas.microsoft.com/office/drawing/2018/hyperlinkcolor">
+    <mc:Fallback xmlns:ahyp="http://schemas.microsoft.com/office/drawing/2018/hyperlinkcolor" xmlns:p15="http://schemas.microsoft.com/office/powerpoint/2012/main" xmlns:com="http://schemas.openxmlformats.org/drawingml/2006/compatibility" xmlns:pvml="urn:schemas-microsoft-com:office:powerpoint" xmlns:v="urn:schemas-microsoft-com:vml" xmlns:o="urn:schemas-microsoft-com:office:office" xmlns:dgm="http://schemas.openxmlformats.org/drawingml/2006/diagram" xmlns:c="http://schemas.openxmlformats.org/drawingml/2006/chart" xmlns:mv="urn:schemas-microsoft-com:mac:vml" xmlns="">
       <p:transition spd="slow">
         <p:fade/>
       </p:transition>
@@ -14984,7 +15088,7 @@
 </p:sld>
 </file>
 
-<file path=ppt/slides/slide17.xml><?xml version="1.0" encoding="utf-8"?>
+<file path=ppt/slides/slide18.xml><?xml version="1.0" encoding="utf-8"?>
 <p:sld xmlns:a="http://schemas.openxmlformats.org/drawingml/2006/main" xmlns:r="http://schemas.openxmlformats.org/officeDocument/2006/relationships" xmlns:p="http://schemas.openxmlformats.org/presentationml/2006/main">
   <p:cSld>
     <p:spTree>
@@ -15044,7 +15148,7 @@
               <a:buChar char="•"/>
             </a:pPr>
             <a:r>
-              <a:rPr lang="en-GB" dirty="0" smtClean="0"/>
+              <a:rPr lang="en-GB" sz="1800" dirty="0" smtClean="0"/>
               <a:t>Lots of lessons picked up throughout the programming of the API’s.</a:t>
             </a:r>
           </a:p>
@@ -15054,7 +15158,7 @@
               <a:buChar char="•"/>
             </a:pPr>
             <a:r>
-              <a:rPr lang="en-GB" dirty="0" smtClean="0"/>
+              <a:rPr lang="en-GB" sz="1800" dirty="0" smtClean="0"/>
               <a:t>Idempotency needs to be accounted for when performing CRUD operations on DynamoDB;</a:t>
             </a:r>
           </a:p>
@@ -15064,7 +15168,7 @@
               <a:buChar char="•"/>
             </a:pPr>
             <a:r>
-              <a:rPr lang="en-GB" dirty="0" smtClean="0"/>
+              <a:rPr lang="en-GB" sz="1800" dirty="0" smtClean="0"/>
               <a:t>Payloads should be done via Json as opposed to parsing arguments where possible, due to mandatory arguments being required when using a parser.  This caused issues when only sending key field information.</a:t>
             </a:r>
           </a:p>
@@ -15074,9 +15178,14 @@
               <a:buChar char="•"/>
             </a:pPr>
             <a:r>
-              <a:rPr lang="en-GB" dirty="0" smtClean="0"/>
-              <a:t>File handling is relatively straightforward but ideally, bucket names et. Al. should be variablised when possible to reduce wet code.  Typo’s in bucket name caused a lot of consternation and confusion when writing the API.</a:t>
-            </a:r>
+              <a:rPr lang="en-GB" sz="1800" dirty="0" smtClean="0"/>
+              <a:t>File handling is relatively straightforward but ideally, bucket names et. Al. should be variablised when possible to reduce wet code.  Typo’s in bucket name caused a lot of consternation and confusion when writing the API</a:t>
+            </a:r>
+            <a:r>
+              <a:rPr lang="en-GB" sz="1800" dirty="0"/>
+              <a:t>. </a:t>
+            </a:r>
+            <a:endParaRPr lang="en-GB" sz="1800" dirty="0" smtClean="0"/>
           </a:p>
           <a:p>
             <a:pPr marL="571500" indent="-342900">
@@ -15084,9 +15193,10 @@
               <a:buChar char="•"/>
             </a:pPr>
             <a:r>
-              <a:rPr lang="en-GB" dirty="0" smtClean="0"/>
-              <a:t>DynamoDB is not suited for regular searching and scanning of database records.  Alternatives such as RDS are better.</a:t>
-            </a:r>
+              <a:rPr lang="en-GB" sz="1800" dirty="0" smtClean="0"/>
+              <a:t>Access Permissions and policies are complex.  Case in point S3FullAccess does not allow a user to delete an object, giving access denied errors.  A Lambda was the only solution for this.</a:t>
+            </a:r>
+            <a:endParaRPr lang="en-GB" sz="1800" dirty="0"/>
           </a:p>
           <a:p>
             <a:pPr marL="571500" indent="-342900">
@@ -15094,10 +15204,27 @@
               <a:buChar char="•"/>
             </a:pPr>
             <a:r>
-              <a:rPr lang="en-GB" dirty="0" smtClean="0"/>
-              <a:t>Code 200 returns are not always correct, code 200 indicates the endpoint was successfully hit by the API request, not that the function of the API was successful, additional code was required to handle exceptions.</a:t>
-            </a:r>
-            <a:endParaRPr lang="en-GB" dirty="0"/>
+              <a:rPr lang="en-GB" sz="1800" dirty="0" smtClean="0"/>
+              <a:t>DynamoDB </a:t>
+            </a:r>
+            <a:r>
+              <a:rPr lang="en-GB" sz="1800" dirty="0" smtClean="0"/>
+              <a:t>is not suited for regular searching and scanning of database records.  Alternatives such as RDS are better.</a:t>
+            </a:r>
+          </a:p>
+          <a:p>
+            <a:pPr marL="571500" indent="-342900">
+              <a:buFont typeface="Arial" panose="020B0604020202020204" pitchFamily="34" charset="0"/>
+              <a:buChar char="•"/>
+            </a:pPr>
+            <a:r>
+              <a:rPr lang="en-GB" sz="1800" dirty="0" smtClean="0"/>
+              <a:t>Code 200 returns are not always correct, code 200 indicates the endpoint was successfully hit by the API request, not that the function of the API was successful, additional code was required to handle exceptions</a:t>
+            </a:r>
+            <a:r>
+              <a:rPr lang="en-GB" sz="1800" dirty="0" smtClean="0"/>
+              <a:t>.</a:t>
+            </a:r>
           </a:p>
         </p:txBody>
       </p:sp>
@@ -15117,7 +15244,7 @@
         <p:fade/>
       </p:transition>
     </mc:Choice>
-    <mc:Fallback xmlns="" xmlns:mv="urn:schemas-microsoft-com:mac:vml" xmlns:c="http://schemas.openxmlformats.org/drawingml/2006/chart" xmlns:dgm="http://schemas.openxmlformats.org/drawingml/2006/diagram" xmlns:o="urn:schemas-microsoft-com:office:office" xmlns:v="urn:schemas-microsoft-com:vml" xmlns:pvml="urn:schemas-microsoft-com:office:powerpoint" xmlns:com="http://schemas.openxmlformats.org/drawingml/2006/compatibility" xmlns:p15="http://schemas.microsoft.com/office/powerpoint/2012/main" xmlns:ahyp="http://schemas.microsoft.com/office/drawing/2018/hyperlinkcolor">
+    <mc:Fallback xmlns:ahyp="http://schemas.microsoft.com/office/drawing/2018/hyperlinkcolor" xmlns:p15="http://schemas.microsoft.com/office/powerpoint/2012/main" xmlns:com="http://schemas.openxmlformats.org/drawingml/2006/compatibility" xmlns:pvml="urn:schemas-microsoft-com:office:powerpoint" xmlns:v="urn:schemas-microsoft-com:vml" xmlns:o="urn:schemas-microsoft-com:office:office" xmlns:dgm="http://schemas.openxmlformats.org/drawingml/2006/diagram" xmlns:c="http://schemas.openxmlformats.org/drawingml/2006/chart" xmlns:mv="urn:schemas-microsoft-com:mac:vml" xmlns="">
       <p:transition spd="slow">
         <p:fade/>
       </p:transition>
@@ -15126,7 +15253,7 @@
 </p:sld>
 </file>
 
-<file path=ppt/slides/slide18.xml><?xml version="1.0" encoding="utf-8"?>
+<file path=ppt/slides/slide19.xml><?xml version="1.0" encoding="utf-8"?>
 <p:sld xmlns:a="http://schemas.openxmlformats.org/drawingml/2006/main" xmlns:r="http://schemas.openxmlformats.org/officeDocument/2006/relationships" xmlns:p="http://schemas.openxmlformats.org/presentationml/2006/main">
   <p:cSld>
     <p:spTree>
@@ -17908,7 +18035,7 @@
         <p:fade/>
       </p:transition>
     </mc:Choice>
-    <mc:Fallback xmlns="" xmlns:mv="urn:schemas-microsoft-com:mac:vml" xmlns:c="http://schemas.openxmlformats.org/drawingml/2006/chart" xmlns:dgm="http://schemas.openxmlformats.org/drawingml/2006/diagram" xmlns:o="urn:schemas-microsoft-com:office:office" xmlns:v="urn:schemas-microsoft-com:vml" xmlns:pvml="urn:schemas-microsoft-com:office:powerpoint" xmlns:com="http://schemas.openxmlformats.org/drawingml/2006/compatibility" xmlns:p15="http://schemas.microsoft.com/office/powerpoint/2012/main" xmlns:ahyp="http://schemas.microsoft.com/office/drawing/2018/hyperlinkcolor">
+    <mc:Fallback xmlns:ahyp="http://schemas.microsoft.com/office/drawing/2018/hyperlinkcolor" xmlns:p15="http://schemas.microsoft.com/office/powerpoint/2012/main" xmlns:com="http://schemas.openxmlformats.org/drawingml/2006/compatibility" xmlns:pvml="urn:schemas-microsoft-com:office:powerpoint" xmlns:v="urn:schemas-microsoft-com:vml" xmlns:o="urn:schemas-microsoft-com:office:office" xmlns:dgm="http://schemas.openxmlformats.org/drawingml/2006/diagram" xmlns:c="http://schemas.openxmlformats.org/drawingml/2006/chart" xmlns:mv="urn:schemas-microsoft-com:mac:vml" xmlns="">
       <p:transition spd="slow">
         <p:fade/>
       </p:transition>
@@ -17921,43 +18048,6 @@
       </p:par>
     </p:tnLst>
   </p:timing>
-</p:sld>
-</file>
-
-<file path=ppt/slides/slide19.xml><?xml version="1.0" encoding="utf-8"?>
-<p:sld xmlns:a="http://schemas.openxmlformats.org/drawingml/2006/main" xmlns:r="http://schemas.openxmlformats.org/officeDocument/2006/relationships" xmlns:p="http://schemas.openxmlformats.org/presentationml/2006/main">
-  <p:cSld>
-    <p:spTree>
-      <p:nvGrpSpPr>
-        <p:cNvPr id="1" name="Shape 1395"/>
-        <p:cNvGrpSpPr/>
-        <p:nvPr/>
-      </p:nvGrpSpPr>
-      <p:grpSpPr>
-        <a:xfrm>
-          <a:off x="0" y="0"/>
-          <a:ext cx="0" cy="0"/>
-          <a:chOff x="0" y="0"/>
-          <a:chExt cx="0" cy="0"/>
-        </a:xfrm>
-      </p:grpSpPr>
-    </p:spTree>
-  </p:cSld>
-  <p:clrMapOvr>
-    <a:masterClrMapping/>
-  </p:clrMapOvr>
-  <mc:AlternateContent xmlns:mc="http://schemas.openxmlformats.org/markup-compatibility/2006" xmlns:p14="http://schemas.microsoft.com/office/powerpoint/2010/main">
-    <mc:Choice Requires="p14">
-      <p:transition spd="med" p14:dur="700">
-        <p:fade/>
-      </p:transition>
-    </mc:Choice>
-    <mc:Fallback xmlns="" xmlns:mv="urn:schemas-microsoft-com:mac:vml" xmlns:c="http://schemas.openxmlformats.org/drawingml/2006/chart" xmlns:dgm="http://schemas.openxmlformats.org/drawingml/2006/diagram" xmlns:o="urn:schemas-microsoft-com:office:office" xmlns:v="urn:schemas-microsoft-com:vml" xmlns:pvml="urn:schemas-microsoft-com:office:powerpoint" xmlns:com="http://schemas.openxmlformats.org/drawingml/2006/compatibility" xmlns:p15="http://schemas.microsoft.com/office/powerpoint/2012/main" xmlns:ahyp="http://schemas.microsoft.com/office/drawing/2018/hyperlinkcolor">
-      <p:transition spd="slow">
-        <p:fade/>
-      </p:transition>
-    </mc:Fallback>
-  </mc:AlternateContent>
 </p:sld>
 </file>
 
@@ -19304,7 +19394,7 @@
         <p:fade/>
       </p:transition>
     </mc:Choice>
-    <mc:Fallback xmlns="" xmlns:mv="urn:schemas-microsoft-com:mac:vml" xmlns:c="http://schemas.openxmlformats.org/drawingml/2006/chart" xmlns:dgm="http://schemas.openxmlformats.org/drawingml/2006/diagram" xmlns:o="urn:schemas-microsoft-com:office:office" xmlns:v="urn:schemas-microsoft-com:vml" xmlns:pvml="urn:schemas-microsoft-com:office:powerpoint" xmlns:com="http://schemas.openxmlformats.org/drawingml/2006/compatibility" xmlns:p15="http://schemas.microsoft.com/office/powerpoint/2012/main" xmlns:ahyp="http://schemas.microsoft.com/office/drawing/2018/hyperlinkcolor">
+    <mc:Fallback xmlns:ahyp="http://schemas.microsoft.com/office/drawing/2018/hyperlinkcolor" xmlns:p15="http://schemas.microsoft.com/office/powerpoint/2012/main" xmlns:com="http://schemas.openxmlformats.org/drawingml/2006/compatibility" xmlns:pvml="urn:schemas-microsoft-com:office:powerpoint" xmlns:v="urn:schemas-microsoft-com:vml" xmlns:o="urn:schemas-microsoft-com:office:office" xmlns:dgm="http://schemas.openxmlformats.org/drawingml/2006/diagram" xmlns:c="http://schemas.openxmlformats.org/drawingml/2006/chart" xmlns:mv="urn:schemas-microsoft-com:mac:vml" xmlns="">
       <p:transition spd="slow">
         <p:fade/>
       </p:transition>
@@ -19317,6 +19407,43 @@
       </p:par>
     </p:tnLst>
   </p:timing>
+</p:sld>
+</file>
+
+<file path=ppt/slides/slide20.xml><?xml version="1.0" encoding="utf-8"?>
+<p:sld xmlns:a="http://schemas.openxmlformats.org/drawingml/2006/main" xmlns:r="http://schemas.openxmlformats.org/officeDocument/2006/relationships" xmlns:p="http://schemas.openxmlformats.org/presentationml/2006/main">
+  <p:cSld>
+    <p:spTree>
+      <p:nvGrpSpPr>
+        <p:cNvPr id="1" name="Shape 1395"/>
+        <p:cNvGrpSpPr/>
+        <p:nvPr/>
+      </p:nvGrpSpPr>
+      <p:grpSpPr>
+        <a:xfrm>
+          <a:off x="0" y="0"/>
+          <a:ext cx="0" cy="0"/>
+          <a:chOff x="0" y="0"/>
+          <a:chExt cx="0" cy="0"/>
+        </a:xfrm>
+      </p:grpSpPr>
+    </p:spTree>
+  </p:cSld>
+  <p:clrMapOvr>
+    <a:masterClrMapping/>
+  </p:clrMapOvr>
+  <mc:AlternateContent xmlns:mc="http://schemas.openxmlformats.org/markup-compatibility/2006" xmlns:p14="http://schemas.microsoft.com/office/powerpoint/2010/main">
+    <mc:Choice Requires="p14">
+      <p:transition spd="med" p14:dur="700">
+        <p:fade/>
+      </p:transition>
+    </mc:Choice>
+    <mc:Fallback xmlns:ahyp="http://schemas.microsoft.com/office/drawing/2018/hyperlinkcolor" xmlns:p15="http://schemas.microsoft.com/office/powerpoint/2012/main" xmlns:com="http://schemas.openxmlformats.org/drawingml/2006/compatibility" xmlns:pvml="urn:schemas-microsoft-com:office:powerpoint" xmlns:v="urn:schemas-microsoft-com:vml" xmlns:o="urn:schemas-microsoft-com:office:office" xmlns:dgm="http://schemas.openxmlformats.org/drawingml/2006/diagram" xmlns:c="http://schemas.openxmlformats.org/drawingml/2006/chart" xmlns:mv="urn:schemas-microsoft-com:mac:vml" xmlns="">
+      <p:transition spd="slow">
+        <p:fade/>
+      </p:transition>
+    </mc:Fallback>
+  </mc:AlternateContent>
 </p:sld>
 </file>
 
@@ -19458,7 +19585,7 @@
         <p:fade/>
       </p:transition>
     </mc:Choice>
-    <mc:Fallback xmlns="" xmlns:mv="urn:schemas-microsoft-com:mac:vml" xmlns:c="http://schemas.openxmlformats.org/drawingml/2006/chart" xmlns:dgm="http://schemas.openxmlformats.org/drawingml/2006/diagram" xmlns:o="urn:schemas-microsoft-com:office:office" xmlns:v="urn:schemas-microsoft-com:vml" xmlns:pvml="urn:schemas-microsoft-com:office:powerpoint" xmlns:com="http://schemas.openxmlformats.org/drawingml/2006/compatibility" xmlns:p15="http://schemas.microsoft.com/office/powerpoint/2012/main" xmlns:ahyp="http://schemas.microsoft.com/office/drawing/2018/hyperlinkcolor">
+    <mc:Fallback xmlns:ahyp="http://schemas.microsoft.com/office/drawing/2018/hyperlinkcolor" xmlns:p15="http://schemas.microsoft.com/office/powerpoint/2012/main" xmlns:com="http://schemas.openxmlformats.org/drawingml/2006/compatibility" xmlns:pvml="urn:schemas-microsoft-com:office:powerpoint" xmlns:v="urn:schemas-microsoft-com:vml" xmlns:o="urn:schemas-microsoft-com:office:office" xmlns:dgm="http://schemas.openxmlformats.org/drawingml/2006/diagram" xmlns:c="http://schemas.openxmlformats.org/drawingml/2006/chart" xmlns:mv="urn:schemas-microsoft-com:mac:vml" xmlns="">
       <p:transition spd="slow">
         <p:fade/>
       </p:transition>
@@ -19938,7 +20065,7 @@
         </p:blipFill>
         <p:spPr>
           <a:xfrm>
-            <a:off x="9355701" y="2301228"/>
+            <a:off x="9355701" y="2109504"/>
             <a:ext cx="806737" cy="777363"/>
           </a:xfrm>
           <a:prstGeom prst="rect">
@@ -19975,7 +20102,7 @@
         </p:blipFill>
         <p:spPr>
           <a:xfrm>
-            <a:off x="9346546" y="3910904"/>
+            <a:off x="9346546" y="4294360"/>
             <a:ext cx="806737" cy="777363"/>
           </a:xfrm>
           <a:prstGeom prst="rect">
@@ -20175,7 +20302,7 @@
         </p:nvSpPr>
         <p:spPr>
           <a:xfrm>
-            <a:off x="9054132" y="3124597"/>
+            <a:off x="9054132" y="2932873"/>
             <a:ext cx="1452457" cy="253916"/>
           </a:xfrm>
           <a:prstGeom prst="rect">
@@ -20205,7 +20332,7 @@
         </p:nvSpPr>
         <p:spPr>
           <a:xfrm>
-            <a:off x="9204742" y="4753547"/>
+            <a:off x="9204742" y="5122255"/>
             <a:ext cx="1452457" cy="253916"/>
           </a:xfrm>
           <a:prstGeom prst="rect">
@@ -20503,6 +20630,73 @@
           </a:p>
         </p:txBody>
       </p:sp>
+      <p:pic>
+        <p:nvPicPr>
+          <p:cNvPr id="29" name="Picture 28"/>
+          <p:cNvPicPr>
+            <a:picLocks noChangeAspect="1"/>
+          </p:cNvPicPr>
+          <p:nvPr/>
+        </p:nvPicPr>
+        <p:blipFill rotWithShape="1">
+          <a:blip r:embed="rId6"/>
+          <a:srcRect l="-1" t="9556" r="7815"/>
+          <a:stretch/>
+        </p:blipFill>
+        <p:spPr>
+          <a:xfrm>
+            <a:off x="9346546" y="3212744"/>
+            <a:ext cx="806737" cy="777363"/>
+          </a:xfrm>
+          <a:prstGeom prst="rect">
+            <a:avLst/>
+          </a:prstGeom>
+          <a:ln w="38100" cap="sq">
+            <a:solidFill>
+              <a:srgbClr val="000000"/>
+            </a:solidFill>
+            <a:prstDash val="solid"/>
+            <a:miter lim="800000"/>
+          </a:ln>
+          <a:effectLst>
+            <a:outerShdw blurRad="50800" dist="38100" dir="2700000" algn="tl" rotWithShape="0">
+              <a:srgbClr val="000000">
+                <a:alpha val="43000"/>
+              </a:srgbClr>
+            </a:outerShdw>
+          </a:effectLst>
+        </p:spPr>
+      </p:pic>
+      <p:sp>
+        <p:nvSpPr>
+          <p:cNvPr id="32" name="TextBox 31"/>
+          <p:cNvSpPr txBox="1"/>
+          <p:nvPr/>
+        </p:nvSpPr>
+        <p:spPr>
+          <a:xfrm>
+            <a:off x="9280963" y="3990107"/>
+            <a:ext cx="937901" cy="253916"/>
+          </a:xfrm>
+          <a:prstGeom prst="rect">
+            <a:avLst/>
+          </a:prstGeom>
+          <a:noFill/>
+        </p:spPr>
+        <p:txBody>
+          <a:bodyPr wrap="square" rtlCol="0">
+            <a:spAutoFit/>
+          </a:bodyPr>
+          <a:lstStyle/>
+          <a:p>
+            <a:r>
+              <a:rPr lang="en-GB" sz="1050" dirty="0" smtClean="0"/>
+              <a:t>deleteObject</a:t>
+            </a:r>
+            <a:endParaRPr lang="en-GB" sz="1050" dirty="0"/>
+          </a:p>
+        </p:txBody>
+      </p:sp>
     </p:spTree>
     <p:extLst>
       <p:ext uri="{BB962C8B-B14F-4D97-AF65-F5344CB8AC3E}">
@@ -20519,7 +20713,7 @@
         <p:fade/>
       </p:transition>
     </mc:Choice>
-    <mc:Fallback xmlns="" xmlns:mv="urn:schemas-microsoft-com:mac:vml" xmlns:c="http://schemas.openxmlformats.org/drawingml/2006/chart" xmlns:dgm="http://schemas.openxmlformats.org/drawingml/2006/diagram" xmlns:o="urn:schemas-microsoft-com:office:office" xmlns:v="urn:schemas-microsoft-com:vml" xmlns:pvml="urn:schemas-microsoft-com:office:powerpoint" xmlns:com="http://schemas.openxmlformats.org/drawingml/2006/compatibility" xmlns:p15="http://schemas.microsoft.com/office/powerpoint/2012/main" xmlns:ahyp="http://schemas.microsoft.com/office/drawing/2018/hyperlinkcolor">
+    <mc:Fallback xmlns:ahyp="http://schemas.microsoft.com/office/drawing/2018/hyperlinkcolor" xmlns:p15="http://schemas.microsoft.com/office/powerpoint/2012/main" xmlns:com="http://schemas.openxmlformats.org/drawingml/2006/compatibility" xmlns:pvml="urn:schemas-microsoft-com:office:powerpoint" xmlns:v="urn:schemas-microsoft-com:vml" xmlns:o="urn:schemas-microsoft-com:office:office" xmlns:dgm="http://schemas.openxmlformats.org/drawingml/2006/diagram" xmlns:c="http://schemas.openxmlformats.org/drawingml/2006/chart" xmlns:mv="urn:schemas-microsoft-com:mac:vml" xmlns="">
       <p:transition spd="slow">
         <p:fade/>
       </p:transition>
@@ -20871,7 +21065,7 @@
         <p:fade/>
       </p:transition>
     </mc:Choice>
-    <mc:Fallback xmlns="" xmlns:mv="urn:schemas-microsoft-com:mac:vml" xmlns:c="http://schemas.openxmlformats.org/drawingml/2006/chart" xmlns:dgm="http://schemas.openxmlformats.org/drawingml/2006/diagram" xmlns:o="urn:schemas-microsoft-com:office:office" xmlns:v="urn:schemas-microsoft-com:vml" xmlns:pvml="urn:schemas-microsoft-com:office:powerpoint" xmlns:com="http://schemas.openxmlformats.org/drawingml/2006/compatibility" xmlns:p15="http://schemas.microsoft.com/office/powerpoint/2012/main" xmlns:ahyp="http://schemas.microsoft.com/office/drawing/2018/hyperlinkcolor">
+    <mc:Fallback xmlns:ahyp="http://schemas.microsoft.com/office/drawing/2018/hyperlinkcolor" xmlns:p15="http://schemas.microsoft.com/office/powerpoint/2012/main" xmlns:com="http://schemas.openxmlformats.org/drawingml/2006/compatibility" xmlns:pvml="urn:schemas-microsoft-com:office:powerpoint" xmlns:v="urn:schemas-microsoft-com:vml" xmlns:o="urn:schemas-microsoft-com:office:office" xmlns:dgm="http://schemas.openxmlformats.org/drawingml/2006/diagram" xmlns:c="http://schemas.openxmlformats.org/drawingml/2006/chart" xmlns:mv="urn:schemas-microsoft-com:mac:vml" xmlns="">
       <p:transition spd="slow">
         <p:fade/>
       </p:transition>
@@ -21013,7 +21207,7 @@
         <p:fade/>
       </p:transition>
     </mc:Choice>
-    <mc:Fallback xmlns="" xmlns:mv="urn:schemas-microsoft-com:mac:vml" xmlns:c="http://schemas.openxmlformats.org/drawingml/2006/chart" xmlns:dgm="http://schemas.openxmlformats.org/drawingml/2006/diagram" xmlns:o="urn:schemas-microsoft-com:office:office" xmlns:v="urn:schemas-microsoft-com:vml" xmlns:pvml="urn:schemas-microsoft-com:office:powerpoint" xmlns:com="http://schemas.openxmlformats.org/drawingml/2006/compatibility" xmlns:p15="http://schemas.microsoft.com/office/powerpoint/2012/main" xmlns:ahyp="http://schemas.microsoft.com/office/drawing/2018/hyperlinkcolor">
+    <mc:Fallback xmlns:ahyp="http://schemas.microsoft.com/office/drawing/2018/hyperlinkcolor" xmlns:p15="http://schemas.microsoft.com/office/powerpoint/2012/main" xmlns:com="http://schemas.openxmlformats.org/drawingml/2006/compatibility" xmlns:pvml="urn:schemas-microsoft-com:office:powerpoint" xmlns:v="urn:schemas-microsoft-com:vml" xmlns:o="urn:schemas-microsoft-com:office:office" xmlns:dgm="http://schemas.openxmlformats.org/drawingml/2006/diagram" xmlns:c="http://schemas.openxmlformats.org/drawingml/2006/chart" xmlns:mv="urn:schemas-microsoft-com:mac:vml" xmlns="">
       <p:transition spd="slow">
         <p:fade/>
       </p:transition>
@@ -22095,7 +22289,7 @@
         <p:fade/>
       </p:transition>
     </mc:Choice>
-    <mc:Fallback xmlns="" xmlns:mv="urn:schemas-microsoft-com:mac:vml" xmlns:c="http://schemas.openxmlformats.org/drawingml/2006/chart" xmlns:dgm="http://schemas.openxmlformats.org/drawingml/2006/diagram" xmlns:o="urn:schemas-microsoft-com:office:office" xmlns:v="urn:schemas-microsoft-com:vml" xmlns:pvml="urn:schemas-microsoft-com:office:powerpoint" xmlns:com="http://schemas.openxmlformats.org/drawingml/2006/compatibility" xmlns:p15="http://schemas.microsoft.com/office/powerpoint/2012/main" xmlns:ahyp="http://schemas.microsoft.com/office/drawing/2018/hyperlinkcolor">
+    <mc:Fallback xmlns:ahyp="http://schemas.microsoft.com/office/drawing/2018/hyperlinkcolor" xmlns:p15="http://schemas.microsoft.com/office/powerpoint/2012/main" xmlns:com="http://schemas.openxmlformats.org/drawingml/2006/compatibility" xmlns:pvml="urn:schemas-microsoft-com:office:powerpoint" xmlns:v="urn:schemas-microsoft-com:vml" xmlns:o="urn:schemas-microsoft-com:office:office" xmlns:dgm="http://schemas.openxmlformats.org/drawingml/2006/diagram" xmlns:c="http://schemas.openxmlformats.org/drawingml/2006/chart" xmlns:mv="urn:schemas-microsoft-com:mac:vml" xmlns="">
       <p:transition spd="slow">
         <p:fade/>
       </p:transition>
@@ -22366,7 +22560,7 @@
         <p:fade/>
       </p:transition>
     </mc:Choice>
-    <mc:Fallback xmlns="" xmlns:mv="urn:schemas-microsoft-com:mac:vml" xmlns:c="http://schemas.openxmlformats.org/drawingml/2006/chart" xmlns:dgm="http://schemas.openxmlformats.org/drawingml/2006/diagram" xmlns:o="urn:schemas-microsoft-com:office:office" xmlns:v="urn:schemas-microsoft-com:vml" xmlns:pvml="urn:schemas-microsoft-com:office:powerpoint" xmlns:com="http://schemas.openxmlformats.org/drawingml/2006/compatibility" xmlns:p15="http://schemas.microsoft.com/office/powerpoint/2012/main" xmlns:ahyp="http://schemas.microsoft.com/office/drawing/2018/hyperlinkcolor">
+    <mc:Fallback xmlns:ahyp="http://schemas.microsoft.com/office/drawing/2018/hyperlinkcolor" xmlns:p15="http://schemas.microsoft.com/office/powerpoint/2012/main" xmlns:com="http://schemas.openxmlformats.org/drawingml/2006/compatibility" xmlns:pvml="urn:schemas-microsoft-com:office:powerpoint" xmlns:v="urn:schemas-microsoft-com:vml" xmlns:o="urn:schemas-microsoft-com:office:office" xmlns:dgm="http://schemas.openxmlformats.org/drawingml/2006/diagram" xmlns:c="http://schemas.openxmlformats.org/drawingml/2006/chart" xmlns:mv="urn:schemas-microsoft-com:mac:vml" xmlns="">
       <p:transition spd="slow">
         <p:fade/>
       </p:transition>
@@ -22696,7 +22890,7 @@
         </p:blipFill>
         <p:spPr>
           <a:xfrm>
-            <a:off x="6052914" y="3108334"/>
+            <a:off x="6052914" y="2517885"/>
             <a:ext cx="769981" cy="832313"/>
           </a:xfrm>
           <a:prstGeom prst="rect">
@@ -23134,8 +23328,8 @@
         </p:nvSpPr>
         <p:spPr>
           <a:xfrm>
-            <a:off x="10572749" y="1165123"/>
-            <a:ext cx="3669674" cy="3970318"/>
+            <a:off x="10572749" y="1120879"/>
+            <a:ext cx="3669674" cy="4339650"/>
           </a:xfrm>
           <a:prstGeom prst="rect">
             <a:avLst/>
@@ -23170,40 +23364,56 @@
             </a:r>
           </a:p>
           <a:p>
-            <a:endParaRPr lang="en-GB" dirty="0" smtClean="0"/>
-          </a:p>
-          <a:p>
-            <a:r>
-              <a:rPr lang="en-GB" dirty="0" smtClean="0"/>
+            <a:endParaRPr lang="en-GB" sz="1200" dirty="0" smtClean="0"/>
+          </a:p>
+          <a:p>
+            <a:r>
+              <a:rPr lang="en-GB" sz="1200" dirty="0" smtClean="0"/>
               <a:t>Heroku: Cloud PaaS based solution for hosting cloud based services.  Can communicate with AWS services and Virtual Private Clouds via secure keys.</a:t>
             </a:r>
           </a:p>
           <a:p>
-            <a:endParaRPr lang="en-GB" dirty="0"/>
-          </a:p>
-          <a:p>
-            <a:r>
-              <a:rPr lang="en-GB" dirty="0" smtClean="0"/>
+            <a:endParaRPr lang="en-GB" sz="1200" dirty="0"/>
+          </a:p>
+          <a:p>
+            <a:r>
+              <a:rPr lang="en-GB" sz="1200" dirty="0" smtClean="0"/>
               <a:t>Flask: Python based Library for Website design, comes with RESTful API libraries</a:t>
             </a:r>
           </a:p>
           <a:p>
-            <a:endParaRPr lang="en-GB" dirty="0"/>
-          </a:p>
-          <a:p>
-            <a:r>
-              <a:rPr lang="en-GB" dirty="0" smtClean="0"/>
+            <a:endParaRPr lang="en-GB" sz="1200" dirty="0"/>
+          </a:p>
+          <a:p>
+            <a:r>
+              <a:rPr lang="en-GB" sz="1200" dirty="0" smtClean="0"/>
               <a:t>DynamoDB: NoSQL persistent, non-ephermal database.  Makes use of Json format to store records.</a:t>
             </a:r>
           </a:p>
           <a:p>
-            <a:endParaRPr lang="en-GB" dirty="0"/>
-          </a:p>
-          <a:p>
-            <a:r>
-              <a:rPr lang="en-GB" dirty="0" smtClean="0"/>
-              <a:t>S3: Simple Storage Service.  Cost effective permanent object storage.  Accessible by other AWS Services based on permissions and role assignments.</a:t>
-            </a:r>
+            <a:endParaRPr lang="en-GB" sz="1200" dirty="0"/>
+          </a:p>
+          <a:p>
+            <a:r>
+              <a:rPr lang="en-GB" sz="1200" dirty="0" smtClean="0"/>
+              <a:t>S3: Simple Storage Service.  Cost effective permanent object storage.  Accessible by other AWS Services based on permissions and role assignments</a:t>
+            </a:r>
+            <a:r>
+              <a:rPr lang="en-GB" sz="1200" dirty="0" smtClean="0"/>
+              <a:t>.</a:t>
+            </a:r>
+          </a:p>
+          <a:p>
+            <a:endParaRPr lang="en-GB" sz="1200" dirty="0"/>
+          </a:p>
+          <a:p>
+            <a:r>
+              <a:rPr lang="en-GB" sz="1200" dirty="0"/>
+              <a:t>AWS Lambda: Serverless computing service designed for executing code without needing to manage infrastructure or servers to host said code.</a:t>
+            </a:r>
+          </a:p>
+          <a:p>
+            <a:endParaRPr lang="en-GB" sz="1200" dirty="0" smtClean="0"/>
           </a:p>
         </p:txBody>
       </p:sp>
@@ -23216,7 +23426,7 @@
         <p:spPr>
           <a:xfrm>
             <a:off x="712429" y="5383161"/>
-            <a:ext cx="13529994" cy="2031325"/>
+            <a:ext cx="13529994" cy="2262158"/>
           </a:xfrm>
           <a:prstGeom prst="rect">
             <a:avLst/>
@@ -23256,34 +23466,45 @@
           </a:p>
           <a:p>
             <a:r>
-              <a:rPr lang="en-GB" dirty="0" smtClean="0"/>
+              <a:rPr lang="en-GB" sz="1100" dirty="0" smtClean="0"/>
               <a:t>DynamoDB chosen because of NoSQL format.  No requirement for schema means it is easy to adapt or add/remove attributes for each record as and when required by the business with no loss to functionality. Dynamo struggles with searching through large numbers of records, however, for the purposes of this microservice, data size will be small. Costs are reduced as we can predict usage and set provisioned capacity or use variable, on demand capacity if usage is not known.</a:t>
             </a:r>
           </a:p>
           <a:p>
-            <a:endParaRPr lang="en-GB" dirty="0" smtClean="0"/>
-          </a:p>
-          <a:p>
-            <a:r>
-              <a:rPr lang="en-GB" dirty="0" smtClean="0"/>
+            <a:endParaRPr lang="en-GB" sz="1100" dirty="0" smtClean="0"/>
+          </a:p>
+          <a:p>
+            <a:r>
+              <a:rPr lang="en-GB" sz="1100" dirty="0" smtClean="0"/>
               <a:t>S3</a:t>
             </a:r>
             <a:r>
-              <a:rPr lang="en-GB" dirty="0"/>
+              <a:rPr lang="en-GB" sz="1100" dirty="0"/>
               <a:t>: </a:t>
             </a:r>
             <a:r>
-              <a:rPr lang="en-GB" dirty="0" smtClean="0"/>
+              <a:rPr lang="en-GB" sz="1100" dirty="0" smtClean="0"/>
               <a:t>Chosen because S3 is the AWS storage solution.  S3 used rather than S3 Block because S3 offers cost </a:t>
             </a:r>
             <a:r>
-              <a:rPr lang="en-GB" dirty="0"/>
+              <a:rPr lang="en-GB" sz="1100" dirty="0"/>
               <a:t>effective storage for objects.  As we are dealing with image files which should have very little interaction with multiple services in terms of editing or updating, block storage is not a required feature of the microservice.  This further reduces costs</a:t>
             </a:r>
             <a:r>
-              <a:rPr lang="en-GB" dirty="0" smtClean="0"/>
+              <a:rPr lang="en-GB" sz="1100" dirty="0" smtClean="0"/>
               <a:t>.</a:t>
             </a:r>
+          </a:p>
+          <a:p>
+            <a:endParaRPr lang="en-GB" sz="1100" dirty="0"/>
+          </a:p>
+          <a:p>
+            <a:r>
+              <a:rPr lang="en-GB" sz="1100" dirty="0"/>
+              <a:t>Lambda is used here due to cost.  Lambda charges per request ($0.20 per 1m) and this is cheaper than hosting even the smallest EC2 instance as the requests will not be frequent, even at scale.  Speed is also a factor, time needed to activate an EC2 instance that is not started vs a lambda function that runs immediately on request.</a:t>
+            </a:r>
+          </a:p>
+          <a:p>
             <a:endParaRPr lang="en-GB" dirty="0"/>
           </a:p>
         </p:txBody>
@@ -23913,6 +24134,43 @@
           </a:p>
         </p:txBody>
       </p:sp>
+      <p:pic>
+        <p:nvPicPr>
+          <p:cNvPr id="41" name="Picture 40"/>
+          <p:cNvPicPr>
+            <a:picLocks noChangeAspect="1"/>
+          </p:cNvPicPr>
+          <p:nvPr/>
+        </p:nvPicPr>
+        <p:blipFill rotWithShape="1">
+          <a:blip r:embed="rId7"/>
+          <a:srcRect l="-1" t="9556" r="7815"/>
+          <a:stretch/>
+        </p:blipFill>
+        <p:spPr>
+          <a:xfrm>
+            <a:off x="6050757" y="3637057"/>
+            <a:ext cx="806737" cy="777363"/>
+          </a:xfrm>
+          <a:prstGeom prst="rect">
+            <a:avLst/>
+          </a:prstGeom>
+          <a:ln w="38100" cap="sq">
+            <a:solidFill>
+              <a:srgbClr val="000000"/>
+            </a:solidFill>
+            <a:prstDash val="solid"/>
+            <a:miter lim="800000"/>
+          </a:ln>
+          <a:effectLst>
+            <a:outerShdw blurRad="50800" dist="38100" dir="2700000" algn="tl" rotWithShape="0">
+              <a:srgbClr val="000000">
+                <a:alpha val="43000"/>
+              </a:srgbClr>
+            </a:outerShdw>
+          </a:effectLst>
+        </p:spPr>
+      </p:pic>
     </p:spTree>
     <p:extLst>
       <p:ext uri="{BB962C8B-B14F-4D97-AF65-F5344CB8AC3E}">
@@ -23929,7 +24187,7 @@
         <p:fade/>
       </p:transition>
     </mc:Choice>
-    <mc:Fallback xmlns="" xmlns:mv="urn:schemas-microsoft-com:mac:vml" xmlns:c="http://schemas.openxmlformats.org/drawingml/2006/chart" xmlns:dgm="http://schemas.openxmlformats.org/drawingml/2006/diagram" xmlns:o="urn:schemas-microsoft-com:office:office" xmlns:v="urn:schemas-microsoft-com:vml" xmlns:pvml="urn:schemas-microsoft-com:office:powerpoint" xmlns:com="http://schemas.openxmlformats.org/drawingml/2006/compatibility" xmlns:p15="http://schemas.microsoft.com/office/powerpoint/2012/main" xmlns:ahyp="http://schemas.microsoft.com/office/drawing/2018/hyperlinkcolor">
+    <mc:Fallback xmlns:ahyp="http://schemas.microsoft.com/office/drawing/2018/hyperlinkcolor" xmlns:p15="http://schemas.microsoft.com/office/powerpoint/2012/main" xmlns:com="http://schemas.openxmlformats.org/drawingml/2006/compatibility" xmlns:pvml="urn:schemas-microsoft-com:office:powerpoint" xmlns:v="urn:schemas-microsoft-com:vml" xmlns:o="urn:schemas-microsoft-com:office:office" xmlns:dgm="http://schemas.openxmlformats.org/drawingml/2006/diagram" xmlns:c="http://schemas.openxmlformats.org/drawingml/2006/chart" xmlns:mv="urn:schemas-microsoft-com:mac:vml" xmlns="">
       <p:transition spd="slow">
         <p:fade/>
       </p:transition>

</xml_diff>